<commit_message>
Fix typos in presentations
Signed-off-by: Polina Shlepakova <polinashlepakova@gmail.com>
</commit_message>
<xml_diff>
--- a/Facade/Presentation/Facade.pptx
+++ b/Facade/Presentation/Facade.pptx
@@ -31,8 +31,8 @@
     <p:sldId id="305" r:id="rId22"/>
     <p:sldId id="306" r:id="rId23"/>
     <p:sldId id="307" r:id="rId24"/>
-    <p:sldId id="308" r:id="rId25"/>
-    <p:sldId id="309" r:id="rId26"/>
+    <p:sldId id="309" r:id="rId25"/>
+    <p:sldId id="308" r:id="rId26"/>
     <p:sldId id="310" r:id="rId27"/>
     <p:sldId id="285" r:id="rId28"/>
     <p:sldId id="286" r:id="rId29"/>
@@ -2096,7 +2096,7 @@
                 <a:ea typeface="+mn-ea"/>
                 <a:cs typeface="+mn-cs"/>
               </a:rPr>
-              <a:t>можна зробити </a:t>
+              <a:t>схожий на </a:t>
             </a:r>
             <a:r>
               <a:rPr lang="ru-RU" sz="1200" b="1" i="0" u="none" strike="noStrike" kern="1200" baseline="0" smtClean="0">
@@ -2107,7 +2107,7 @@
                 <a:ea typeface="+mn-ea"/>
                 <a:cs typeface="+mn-cs"/>
               </a:rPr>
-              <a:t>Одинаком</a:t>
+              <a:t>Заступника </a:t>
             </a:r>
             <a:r>
               <a:rPr lang="ru-RU" sz="1200" b="0" i="0" u="none" strike="noStrike" kern="1200" baseline="0" smtClean="0">
@@ -2118,7 +2118,51 @@
                 <a:ea typeface="+mn-ea"/>
                 <a:cs typeface="+mn-cs"/>
               </a:rPr>
-              <a:t>, оскільки зазвичай потрібен тільки один об’єкт-фасад.</a:t>
+              <a:t>тим, що заміщує складну підсистему і може сам її ініціалізувати. Але на відміну від </a:t>
+            </a:r>
+            <a:r>
+              <a:rPr lang="ru-RU" sz="1200" b="0" i="1" u="none" strike="noStrike" kern="1200" baseline="0" smtClean="0">
+                <a:solidFill>
+                  <a:schemeClr val="tx1"/>
+                </a:solidFill>
+                <a:latin typeface="+mn-lt"/>
+                <a:ea typeface="+mn-ea"/>
+                <a:cs typeface="+mn-cs"/>
+              </a:rPr>
+              <a:t>Фасаду</a:t>
+            </a:r>
+            <a:r>
+              <a:rPr lang="ru-RU" sz="1200" b="0" i="0" u="none" strike="noStrike" kern="1200" baseline="0" smtClean="0">
+                <a:solidFill>
+                  <a:schemeClr val="tx1"/>
+                </a:solidFill>
+                <a:latin typeface="+mn-lt"/>
+                <a:ea typeface="+mn-ea"/>
+                <a:cs typeface="+mn-cs"/>
+              </a:rPr>
+              <a:t>, </a:t>
+            </a:r>
+            <a:r>
+              <a:rPr lang="ru-RU" sz="1200" b="0" i="1" u="none" strike="noStrike" kern="1200" baseline="0" smtClean="0">
+                <a:solidFill>
+                  <a:schemeClr val="tx1"/>
+                </a:solidFill>
+                <a:latin typeface="+mn-lt"/>
+                <a:ea typeface="+mn-ea"/>
+                <a:cs typeface="+mn-cs"/>
+              </a:rPr>
+              <a:t>Заступник </a:t>
+            </a:r>
+            <a:r>
+              <a:rPr lang="ru-RU" sz="1200" b="0" i="0" u="none" strike="noStrike" kern="1200" baseline="0" smtClean="0">
+                <a:solidFill>
+                  <a:schemeClr val="tx1"/>
+                </a:solidFill>
+                <a:latin typeface="+mn-lt"/>
+                <a:ea typeface="+mn-ea"/>
+                <a:cs typeface="+mn-cs"/>
+              </a:rPr>
+              <a:t>має той самий інтерфейс, що і його службовий об’єкт, завдяки чому їх можна взаємозамінювати.</a:t>
             </a:r>
             <a:endParaRPr lang="uk-UA" baseline="0" smtClean="0"/>
           </a:p>
@@ -2224,7 +2268,7 @@
                 <a:ea typeface="+mn-ea"/>
                 <a:cs typeface="+mn-cs"/>
               </a:rPr>
-              <a:t>схожий на </a:t>
+              <a:t>можна зробити </a:t>
             </a:r>
             <a:r>
               <a:rPr lang="ru-RU" sz="1200" b="1" i="0" u="none" strike="noStrike" kern="1200" baseline="0" smtClean="0">
@@ -2235,7 +2279,7 @@
                 <a:ea typeface="+mn-ea"/>
                 <a:cs typeface="+mn-cs"/>
               </a:rPr>
-              <a:t>Заступника </a:t>
+              <a:t>Одинаком</a:t>
             </a:r>
             <a:r>
               <a:rPr lang="ru-RU" sz="1200" b="0" i="0" u="none" strike="noStrike" kern="1200" baseline="0" smtClean="0">
@@ -2246,51 +2290,7 @@
                 <a:ea typeface="+mn-ea"/>
                 <a:cs typeface="+mn-cs"/>
               </a:rPr>
-              <a:t>тим, що заміщує складну підсистему і може сам її ініціалізувати. Але на відміну від </a:t>
-            </a:r>
-            <a:r>
-              <a:rPr lang="ru-RU" sz="1200" b="0" i="1" u="none" strike="noStrike" kern="1200" baseline="0" smtClean="0">
-                <a:solidFill>
-                  <a:schemeClr val="tx1"/>
-                </a:solidFill>
-                <a:latin typeface="+mn-lt"/>
-                <a:ea typeface="+mn-ea"/>
-                <a:cs typeface="+mn-cs"/>
-              </a:rPr>
-              <a:t>Фасаду</a:t>
-            </a:r>
-            <a:r>
-              <a:rPr lang="ru-RU" sz="1200" b="0" i="0" u="none" strike="noStrike" kern="1200" baseline="0" smtClean="0">
-                <a:solidFill>
-                  <a:schemeClr val="tx1"/>
-                </a:solidFill>
-                <a:latin typeface="+mn-lt"/>
-                <a:ea typeface="+mn-ea"/>
-                <a:cs typeface="+mn-cs"/>
-              </a:rPr>
-              <a:t>, </a:t>
-            </a:r>
-            <a:r>
-              <a:rPr lang="ru-RU" sz="1200" b="0" i="1" u="none" strike="noStrike" kern="1200" baseline="0" smtClean="0">
-                <a:solidFill>
-                  <a:schemeClr val="tx1"/>
-                </a:solidFill>
-                <a:latin typeface="+mn-lt"/>
-                <a:ea typeface="+mn-ea"/>
-                <a:cs typeface="+mn-cs"/>
-              </a:rPr>
-              <a:t>Заступник </a:t>
-            </a:r>
-            <a:r>
-              <a:rPr lang="ru-RU" sz="1200" b="0" i="0" u="none" strike="noStrike" kern="1200" baseline="0" smtClean="0">
-                <a:solidFill>
-                  <a:schemeClr val="tx1"/>
-                </a:solidFill>
-                <a:latin typeface="+mn-lt"/>
-                <a:ea typeface="+mn-ea"/>
-                <a:cs typeface="+mn-cs"/>
-              </a:rPr>
-              <a:t>має той самий інтерфейс, що і його службовий об’єкт, завдяки чому їх можна взаємозамінювати.</a:t>
+              <a:t>, оскільки зазвичай потрібен тільки один об’єкт-фасад.</a:t>
             </a:r>
             <a:endParaRPr lang="uk-UA" baseline="0" smtClean="0"/>
           </a:p>
@@ -7104,8 +7104,8 @@
         </p:blipFill>
         <p:spPr>
           <a:xfrm>
-            <a:off x="4139952" y="376496"/>
-            <a:ext cx="4536504" cy="3031426"/>
+            <a:off x="4283968" y="376496"/>
+            <a:ext cx="4392488" cy="2935190"/>
           </a:xfrm>
           <a:prstGeom prst="rect">
             <a:avLst/>
@@ -7519,14 +7519,24 @@
           </a:lstStyle>
           <a:p>
             <a:r>
-              <a:rPr lang="en-US" sz="2800" b="1">
+              <a:rPr lang="en-US" sz="2800" b="1" smtClean="0">
                 <a:solidFill>
                   <a:schemeClr val="tx2"/>
                 </a:solidFill>
                 <a:latin typeface="Courier New" panose="02070309020205020404" pitchFamily="49" charset="0"/>
                 <a:cs typeface="Courier New" panose="02070309020205020404" pitchFamily="49" charset="0"/>
               </a:rPr>
-              <a:t>Test: </a:t>
+              <a:t>Test output</a:t>
+            </a:r>
+            <a:r>
+              <a:rPr lang="en-US" sz="2800" b="1">
+                <a:solidFill>
+                  <a:schemeClr val="tx2"/>
+                </a:solidFill>
+                <a:latin typeface="Courier New" panose="02070309020205020404" pitchFamily="49" charset="0"/>
+                <a:cs typeface="Courier New" panose="02070309020205020404" pitchFamily="49" charset="0"/>
+              </a:rPr>
+              <a:t>: </a:t>
             </a:r>
           </a:p>
           <a:p>
@@ -7535,52 +7545,7 @@
                 <a:latin typeface="Courier New" panose="02070309020205020404" pitchFamily="49" charset="0"/>
                 <a:cs typeface="Courier New" panose="02070309020205020404" pitchFamily="49" charset="0"/>
               </a:rPr>
-              <a:t>launch </a:t>
-            </a:r>
-            <a:r>
-              <a:rPr lang="en-US" sz="2800" smtClean="0">
-                <a:latin typeface="Courier New" panose="02070309020205020404" pitchFamily="49" charset="0"/>
-                <a:cs typeface="Courier New" panose="02070309020205020404" pitchFamily="49" charset="0"/>
-              </a:rPr>
-              <a:t>Facade/Projects/CatTube/cmake-build-debug/CatTube.exe </a:t>
-            </a:r>
-          </a:p>
-          <a:p>
-            <a:r>
-              <a:rPr lang="en-US" sz="2800" b="1" smtClean="0">
-                <a:solidFill>
-                  <a:schemeClr val="tx2"/>
-                </a:solidFill>
-                <a:latin typeface="Courier New" panose="02070309020205020404" pitchFamily="49" charset="0"/>
-                <a:cs typeface="Courier New" panose="02070309020205020404" pitchFamily="49" charset="0"/>
-              </a:rPr>
-              <a:t>Output</a:t>
-            </a:r>
-            <a:r>
-              <a:rPr lang="en-US" sz="2800" b="1">
-                <a:solidFill>
-                  <a:schemeClr val="tx2"/>
-                </a:solidFill>
-                <a:latin typeface="Courier New" panose="02070309020205020404" pitchFamily="49" charset="0"/>
-                <a:cs typeface="Courier New" panose="02070309020205020404" pitchFamily="49" charset="0"/>
-              </a:rPr>
-              <a:t>: </a:t>
-            </a:r>
-          </a:p>
-          <a:p>
-            <a:r>
-              <a:rPr lang="en-US" sz="2800">
-                <a:latin typeface="Courier New" panose="02070309020205020404" pitchFamily="49" charset="0"/>
-                <a:cs typeface="Courier New" panose="02070309020205020404" pitchFamily="49" charset="0"/>
-              </a:rPr>
-              <a:t>New VideoFile : video003_.</a:t>
-            </a:r>
-            <a:r>
-              <a:rPr lang="en-US" sz="2800">
-                <a:latin typeface="Courier New" panose="02070309020205020404" pitchFamily="49" charset="0"/>
-                <a:cs typeface="Courier New" panose="02070309020205020404" pitchFamily="49" charset="0"/>
-              </a:rPr>
-              <a:t>mp4 </a:t>
+              <a:t>New VideoFile : video003_.mp4 </a:t>
             </a:r>
             <a:endParaRPr lang="en-US" sz="2800" smtClean="0">
               <a:latin typeface="Courier New" panose="02070309020205020404" pitchFamily="49" charset="0"/>
@@ -8984,14 +8949,24 @@
           </a:lstStyle>
           <a:p>
             <a:r>
-              <a:rPr lang="en-US" sz="2800" b="1">
+              <a:rPr lang="en-US" sz="2800" b="1" smtClean="0">
                 <a:solidFill>
                   <a:schemeClr val="tx2"/>
                 </a:solidFill>
                 <a:latin typeface="Courier New" panose="02070309020205020404" pitchFamily="49" charset="0"/>
                 <a:cs typeface="Courier New" panose="02070309020205020404" pitchFamily="49" charset="0"/>
               </a:rPr>
-              <a:t>Test: </a:t>
+              <a:t>Test output</a:t>
+            </a:r>
+            <a:r>
+              <a:rPr lang="en-US" sz="2800" b="1">
+                <a:solidFill>
+                  <a:schemeClr val="tx2"/>
+                </a:solidFill>
+                <a:latin typeface="Courier New" panose="02070309020205020404" pitchFamily="49" charset="0"/>
+                <a:cs typeface="Courier New" panose="02070309020205020404" pitchFamily="49" charset="0"/>
+              </a:rPr>
+              <a:t>: </a:t>
             </a:r>
           </a:p>
           <a:p>
@@ -9000,52 +8975,7 @@
                 <a:latin typeface="Courier New" panose="02070309020205020404" pitchFamily="49" charset="0"/>
                 <a:cs typeface="Courier New" panose="02070309020205020404" pitchFamily="49" charset="0"/>
               </a:rPr>
-              <a:t>launch </a:t>
-            </a:r>
-            <a:r>
-              <a:rPr lang="en-US" sz="2800" smtClean="0">
-                <a:latin typeface="Courier New" panose="02070309020205020404" pitchFamily="49" charset="0"/>
-                <a:cs typeface="Courier New" panose="02070309020205020404" pitchFamily="49" charset="0"/>
-              </a:rPr>
-              <a:t>Facade/Projects/CatTube/cmake-build-debug/CatTube.exe </a:t>
-            </a:r>
-          </a:p>
-          <a:p>
-            <a:r>
-              <a:rPr lang="en-US" sz="2800" b="1" smtClean="0">
-                <a:solidFill>
-                  <a:schemeClr val="tx2"/>
-                </a:solidFill>
-                <a:latin typeface="Courier New" panose="02070309020205020404" pitchFamily="49" charset="0"/>
-                <a:cs typeface="Courier New" panose="02070309020205020404" pitchFamily="49" charset="0"/>
-              </a:rPr>
-              <a:t>Output</a:t>
-            </a:r>
-            <a:r>
-              <a:rPr lang="en-US" sz="2800" b="1">
-                <a:solidFill>
-                  <a:schemeClr val="tx2"/>
-                </a:solidFill>
-                <a:latin typeface="Courier New" panose="02070309020205020404" pitchFamily="49" charset="0"/>
-                <a:cs typeface="Courier New" panose="02070309020205020404" pitchFamily="49" charset="0"/>
-              </a:rPr>
-              <a:t>: </a:t>
-            </a:r>
-          </a:p>
-          <a:p>
-            <a:r>
-              <a:rPr lang="en-US" sz="2800">
-                <a:latin typeface="Courier New" panose="02070309020205020404" pitchFamily="49" charset="0"/>
-                <a:cs typeface="Courier New" panose="02070309020205020404" pitchFamily="49" charset="0"/>
-              </a:rPr>
-              <a:t>New VideoFile : video003_.</a:t>
-            </a:r>
-            <a:r>
-              <a:rPr lang="en-US" sz="2800">
-                <a:latin typeface="Courier New" panose="02070309020205020404" pitchFamily="49" charset="0"/>
-                <a:cs typeface="Courier New" panose="02070309020205020404" pitchFamily="49" charset="0"/>
-              </a:rPr>
-              <a:t>mp4 </a:t>
+              <a:t>New VideoFile : video003_.mp4 </a:t>
             </a:r>
             <a:endParaRPr lang="en-US" sz="2800" smtClean="0">
               <a:latin typeface="Courier New" panose="02070309020205020404" pitchFamily="49" charset="0"/>
@@ -10396,14 +10326,24 @@
           </a:lstStyle>
           <a:p>
             <a:r>
-              <a:rPr lang="en-US" sz="2800" b="1">
+              <a:rPr lang="en-US" sz="2800" b="1" smtClean="0">
                 <a:solidFill>
                   <a:schemeClr val="tx2"/>
                 </a:solidFill>
                 <a:latin typeface="Courier New" panose="02070309020205020404" pitchFamily="49" charset="0"/>
                 <a:cs typeface="Courier New" panose="02070309020205020404" pitchFamily="49" charset="0"/>
               </a:rPr>
-              <a:t>Test: </a:t>
+              <a:t>Test output</a:t>
+            </a:r>
+            <a:r>
+              <a:rPr lang="en-US" sz="2800" b="1">
+                <a:solidFill>
+                  <a:schemeClr val="tx2"/>
+                </a:solidFill>
+                <a:latin typeface="Courier New" panose="02070309020205020404" pitchFamily="49" charset="0"/>
+                <a:cs typeface="Courier New" panose="02070309020205020404" pitchFamily="49" charset="0"/>
+              </a:rPr>
+              <a:t>: </a:t>
             </a:r>
           </a:p>
           <a:p>
@@ -10412,52 +10352,7 @@
                 <a:latin typeface="Courier New" panose="02070309020205020404" pitchFamily="49" charset="0"/>
                 <a:cs typeface="Courier New" panose="02070309020205020404" pitchFamily="49" charset="0"/>
               </a:rPr>
-              <a:t>launch </a:t>
-            </a:r>
-            <a:r>
-              <a:rPr lang="en-US" sz="2800" smtClean="0">
-                <a:latin typeface="Courier New" panose="02070309020205020404" pitchFamily="49" charset="0"/>
-                <a:cs typeface="Courier New" panose="02070309020205020404" pitchFamily="49" charset="0"/>
-              </a:rPr>
-              <a:t>Facade/Projects/CatTube/cmake-build-debug/CatTube.exe </a:t>
-            </a:r>
-          </a:p>
-          <a:p>
-            <a:r>
-              <a:rPr lang="en-US" sz="2800" b="1" smtClean="0">
-                <a:solidFill>
-                  <a:schemeClr val="tx2"/>
-                </a:solidFill>
-                <a:latin typeface="Courier New" panose="02070309020205020404" pitchFamily="49" charset="0"/>
-                <a:cs typeface="Courier New" panose="02070309020205020404" pitchFamily="49" charset="0"/>
-              </a:rPr>
-              <a:t>Output</a:t>
-            </a:r>
-            <a:r>
-              <a:rPr lang="en-US" sz="2800" b="1">
-                <a:solidFill>
-                  <a:schemeClr val="tx2"/>
-                </a:solidFill>
-                <a:latin typeface="Courier New" panose="02070309020205020404" pitchFamily="49" charset="0"/>
-                <a:cs typeface="Courier New" panose="02070309020205020404" pitchFamily="49" charset="0"/>
-              </a:rPr>
-              <a:t>: </a:t>
-            </a:r>
-          </a:p>
-          <a:p>
-            <a:r>
-              <a:rPr lang="en-US" sz="2800">
-                <a:latin typeface="Courier New" panose="02070309020205020404" pitchFamily="49" charset="0"/>
-                <a:cs typeface="Courier New" panose="02070309020205020404" pitchFamily="49" charset="0"/>
-              </a:rPr>
-              <a:t>New VideoFile : video003_.</a:t>
-            </a:r>
-            <a:r>
-              <a:rPr lang="en-US" sz="2800">
-                <a:latin typeface="Courier New" panose="02070309020205020404" pitchFamily="49" charset="0"/>
-                <a:cs typeface="Courier New" panose="02070309020205020404" pitchFamily="49" charset="0"/>
-              </a:rPr>
-              <a:t>mp4 </a:t>
+              <a:t>New VideoFile : video003_.mp4 </a:t>
             </a:r>
             <a:endParaRPr lang="en-US" sz="2800" smtClean="0">
               <a:latin typeface="Courier New" panose="02070309020205020404" pitchFamily="49" charset="0"/>
@@ -10978,17 +10873,7 @@
                   </a:schemeClr>
                 </a:solidFill>
               </a:rPr>
-              <a:t>ource: GoF book, </a:t>
-            </a:r>
-            <a:r>
-              <a:rPr lang="en-US" smtClean="0">
-                <a:solidFill>
-                  <a:schemeClr val="accent6">
-                    <a:lumMod val="75000"/>
-                  </a:schemeClr>
-                </a:solidFill>
-              </a:rPr>
-              <a:t>Facade, Applicability</a:t>
+              <a:t>ource: GoF book, Facade, Applicability</a:t>
             </a:r>
             <a:endParaRPr lang="en-US" u="sng">
               <a:solidFill>
@@ -11424,11 +11309,7 @@
             </a:r>
             <a:r>
               <a:rPr lang="en-US" sz="3200"/>
-              <a:t> between clients and the implementation classes of </a:t>
-            </a:r>
-            <a:r>
-              <a:rPr lang="en-US" sz="3200"/>
-              <a:t>an </a:t>
+              <a:t> between clients and the implementation classes of an </a:t>
             </a:r>
             <a:r>
               <a:rPr lang="en-US" sz="3200" smtClean="0"/>
@@ -11480,17 +11361,7 @@
                   </a:schemeClr>
                 </a:solidFill>
               </a:rPr>
-              <a:t>ource: GoF book, </a:t>
-            </a:r>
-            <a:r>
-              <a:rPr lang="en-US" smtClean="0">
-                <a:solidFill>
-                  <a:schemeClr val="accent6">
-                    <a:lumMod val="75000"/>
-                  </a:schemeClr>
-                </a:solidFill>
-              </a:rPr>
-              <a:t>Facade, Applicability</a:t>
+              <a:t>ource: GoF book, Facade, Applicability</a:t>
             </a:r>
             <a:endParaRPr lang="en-US" u="sng">
               <a:solidFill>
@@ -11926,11 +11797,7 @@
             </a:r>
             <a:r>
               <a:rPr lang="en-US" sz="3200"/>
-              <a:t> </a:t>
-            </a:r>
-            <a:r>
-              <a:rPr lang="en-US" sz="3200"/>
-              <a:t>your </a:t>
+              <a:t> your </a:t>
             </a:r>
             <a:r>
               <a:rPr lang="en-US" sz="3200" smtClean="0"/>
@@ -11982,17 +11849,7 @@
                   </a:schemeClr>
                 </a:solidFill>
               </a:rPr>
-              <a:t>ource: GoF book, </a:t>
-            </a:r>
-            <a:r>
-              <a:rPr lang="en-US" smtClean="0">
-                <a:solidFill>
-                  <a:schemeClr val="accent6">
-                    <a:lumMod val="75000"/>
-                  </a:schemeClr>
-                </a:solidFill>
-              </a:rPr>
-              <a:t>Facade, Applicability</a:t>
+              <a:t>ource: GoF book, Facade, Applicability</a:t>
             </a:r>
             <a:endParaRPr lang="en-US" u="sng">
               <a:solidFill>
@@ -12726,14 +12583,14 @@
       </p:sp>
       <p:sp>
         <p:nvSpPr>
-          <p:cNvPr id="11" name="TextBox 10"/>
+          <p:cNvPr id="12" name="TextBox 11"/>
           <p:cNvSpPr txBox="1"/>
           <p:nvPr/>
         </p:nvSpPr>
         <p:spPr>
           <a:xfrm>
-            <a:off x="4892094" y="6165304"/>
-            <a:ext cx="4288418" cy="369332"/>
+            <a:off x="1570672" y="6228020"/>
+            <a:ext cx="7609840" cy="369332"/>
           </a:xfrm>
           <a:prstGeom prst="rect">
             <a:avLst/>
@@ -12764,17 +12621,27 @@
                   </a:schemeClr>
                 </a:solidFill>
               </a:rPr>
-              <a:t>ource: GoF book, </a:t>
-            </a:r>
-            <a:r>
-              <a:rPr lang="en-US" smtClean="0">
+              <a:t>ource: Design Patterns Explained Simply by Alexander Shvets, pg. 2</a:t>
+            </a:r>
+            <a:r>
+              <a:rPr lang="uk-UA" smtClean="0">
                 <a:solidFill>
                   <a:schemeClr val="accent6">
                     <a:lumMod val="75000"/>
                   </a:schemeClr>
                 </a:solidFill>
               </a:rPr>
-              <a:t>Facade, Applicability</a:t>
+              <a:t>1</a:t>
+            </a:r>
+            <a:r>
+              <a:rPr lang="en-US" smtClean="0">
+                <a:solidFill>
+                  <a:schemeClr val="accent6">
+                    <a:lumMod val="75000"/>
+                  </a:schemeClr>
+                </a:solidFill>
+              </a:rPr>
+              <a:t>4</a:t>
             </a:r>
             <a:endParaRPr lang="en-US" u="sng">
               <a:solidFill>
@@ -12845,11 +12712,7 @@
           <a:p>
             <a:r>
               <a:rPr lang="en-US" smtClean="0"/>
-              <a:t>Dis</a:t>
-            </a:r>
-            <a:r>
-              <a:rPr lang="en-US" smtClean="0"/>
-              <a:t>dvantage</a:t>
+              <a:t>Disadvantage</a:t>
             </a:r>
             <a:endParaRPr lang="ru-RU"/>
           </a:p>
@@ -13216,14 +13079,14 @@
       </p:sp>
       <p:sp>
         <p:nvSpPr>
-          <p:cNvPr id="11" name="TextBox 10"/>
+          <p:cNvPr id="12" name="TextBox 11"/>
           <p:cNvSpPr txBox="1"/>
           <p:nvPr/>
         </p:nvSpPr>
         <p:spPr>
           <a:xfrm>
-            <a:off x="4892094" y="6165304"/>
-            <a:ext cx="4288418" cy="369332"/>
+            <a:off x="1570672" y="6228020"/>
+            <a:ext cx="7609840" cy="369332"/>
           </a:xfrm>
           <a:prstGeom prst="rect">
             <a:avLst/>
@@ -13254,17 +13117,27 @@
                   </a:schemeClr>
                 </a:solidFill>
               </a:rPr>
-              <a:t>ource: GoF book, </a:t>
-            </a:r>
-            <a:r>
-              <a:rPr lang="en-US" smtClean="0">
+              <a:t>ource: Design Patterns Explained Simply by Alexander Shvets, pg. 2</a:t>
+            </a:r>
+            <a:r>
+              <a:rPr lang="uk-UA" smtClean="0">
                 <a:solidFill>
                   <a:schemeClr val="accent6">
                     <a:lumMod val="75000"/>
                   </a:schemeClr>
                 </a:solidFill>
               </a:rPr>
-              <a:t>Facade, Applicability</a:t>
+              <a:t>1</a:t>
+            </a:r>
+            <a:r>
+              <a:rPr lang="en-US" smtClean="0">
+                <a:solidFill>
+                  <a:schemeClr val="accent6">
+                    <a:lumMod val="75000"/>
+                  </a:schemeClr>
+                </a:solidFill>
+              </a:rPr>
+              <a:t>4</a:t>
             </a:r>
             <a:endParaRPr lang="en-US" u="sng">
               <a:solidFill>
@@ -13750,14 +13623,14 @@
       </p:sp>
       <p:sp>
         <p:nvSpPr>
-          <p:cNvPr id="11" name="TextBox 10"/>
+          <p:cNvPr id="12" name="TextBox 11"/>
           <p:cNvSpPr txBox="1"/>
           <p:nvPr/>
         </p:nvSpPr>
         <p:spPr>
           <a:xfrm>
-            <a:off x="4892094" y="6165304"/>
-            <a:ext cx="4288418" cy="369332"/>
+            <a:off x="1570672" y="6228020"/>
+            <a:ext cx="7609840" cy="369332"/>
           </a:xfrm>
           <a:prstGeom prst="rect">
             <a:avLst/>
@@ -13788,17 +13661,27 @@
                   </a:schemeClr>
                 </a:solidFill>
               </a:rPr>
-              <a:t>ource: GoF book, </a:t>
-            </a:r>
-            <a:r>
-              <a:rPr lang="en-US" smtClean="0">
+              <a:t>ource: Design Patterns Explained Simply by Alexander Shvets, pg. 2</a:t>
+            </a:r>
+            <a:r>
+              <a:rPr lang="uk-UA" smtClean="0">
                 <a:solidFill>
                   <a:schemeClr val="accent6">
                     <a:lumMod val="75000"/>
                   </a:schemeClr>
                 </a:solidFill>
               </a:rPr>
-              <a:t>Facade, Applicability</a:t>
+              <a:t>1</a:t>
+            </a:r>
+            <a:r>
+              <a:rPr lang="en-US" smtClean="0">
+                <a:solidFill>
+                  <a:schemeClr val="accent6">
+                    <a:lumMod val="75000"/>
+                  </a:schemeClr>
+                </a:solidFill>
+              </a:rPr>
+              <a:t>4</a:t>
             </a:r>
             <a:endParaRPr lang="en-US" u="sng">
               <a:solidFill>
@@ -14266,8 +14149,8 @@
         </p:nvSpPr>
         <p:spPr>
           <a:xfrm>
-            <a:off x="4892094" y="6165304"/>
-            <a:ext cx="4288418" cy="369332"/>
+            <a:off x="4404846" y="6165304"/>
+            <a:ext cx="4775666" cy="369332"/>
           </a:xfrm>
           <a:prstGeom prst="rect">
             <a:avLst/>
@@ -14298,7 +14181,7 @@
                   </a:schemeClr>
                 </a:solidFill>
               </a:rPr>
-              <a:t>ource: GoF book, </a:t>
+              <a:t>ource: GoF book, Facade, </a:t>
             </a:r>
             <a:r>
               <a:rPr lang="en-US" smtClean="0">
@@ -14308,7 +14191,7 @@
                   </a:schemeClr>
                 </a:solidFill>
               </a:rPr>
-              <a:t>Facade, Applicability</a:t>
+              <a:t>Related patterns</a:t>
             </a:r>
             <a:endParaRPr lang="en-US" u="sng">
               <a:solidFill>
@@ -14723,11 +14606,7 @@
           </a:lstStyle>
           <a:p>
             <a:r>
-              <a:rPr lang="en-US" sz="3200"/>
-              <a:t>Usually only one </a:t>
-            </a:r>
-            <a:r>
-              <a:rPr lang="en-US" sz="3200" b="1" i="1">
+              <a:rPr lang="en-US" sz="3200" b="1" i="1" smtClean="0">
                 <a:solidFill>
                   <a:schemeClr val="tx2"/>
                 </a:solidFill>
@@ -14735,52 +14614,67 @@
               <a:t>Facade</a:t>
             </a:r>
             <a:r>
-              <a:rPr lang="en-US" sz="3200">
+              <a:rPr lang="en-US" sz="3200" smtClean="0"/>
+              <a:t> is similar to </a:t>
+            </a:r>
+            <a:r>
+              <a:rPr lang="en-US" sz="3200" i="1" smtClean="0">
                 <a:solidFill>
                   <a:schemeClr val="tx2"/>
                 </a:solidFill>
               </a:rPr>
+              <a:t>Proxy</a:t>
+            </a:r>
+            <a:r>
+              <a:rPr lang="en-US" sz="3200" smtClean="0"/>
+              <a:t>, because it substitutes a complex system and can initialize it.</a:t>
+            </a:r>
+          </a:p>
+          <a:p>
+            <a:r>
+              <a:rPr lang="en-US" sz="3200" smtClean="0">
+                <a:cs typeface="Courier New" panose="02070309020205020404" pitchFamily="49" charset="0"/>
+              </a:rPr>
+              <a:t>However, unlike </a:t>
+            </a:r>
+            <a:r>
+              <a:rPr lang="en-US" sz="3200" i="1" smtClean="0">
+                <a:solidFill>
+                  <a:schemeClr val="tx2"/>
+                </a:solidFill>
+                <a:cs typeface="Courier New" panose="02070309020205020404" pitchFamily="49" charset="0"/>
+              </a:rPr>
+              <a:t>Facade</a:t>
+            </a:r>
+            <a:r>
+              <a:rPr lang="en-US" sz="3200" smtClean="0">
+                <a:cs typeface="Courier New" panose="02070309020205020404" pitchFamily="49" charset="0"/>
+              </a:rPr>
+              <a:t>, </a:t>
+            </a:r>
+            <a:r>
+              <a:rPr lang="en-US" sz="3200" i="1" smtClean="0">
+                <a:solidFill>
+                  <a:schemeClr val="tx2"/>
+                </a:solidFill>
+                <a:cs typeface="Courier New" panose="02070309020205020404" pitchFamily="49" charset="0"/>
+              </a:rPr>
+              <a:t>Proxy</a:t>
+            </a:r>
+            <a:r>
+              <a:rPr lang="en-US" sz="3200" smtClean="0">
+                <a:solidFill>
+                  <a:schemeClr val="tx2"/>
+                </a:solidFill>
+                <a:cs typeface="Courier New" panose="02070309020205020404" pitchFamily="49" charset="0"/>
+              </a:rPr>
               <a:t> </a:t>
             </a:r>
             <a:r>
-              <a:rPr lang="en-US" sz="3200"/>
-              <a:t>object is required. Thus </a:t>
-            </a:r>
-            <a:r>
-              <a:rPr lang="en-US" sz="3200" b="1" i="1">
-                <a:solidFill>
-                  <a:schemeClr val="tx2"/>
-                </a:solidFill>
-              </a:rPr>
-              <a:t>Facade</a:t>
-            </a:r>
-            <a:r>
-              <a:rPr lang="en-US" sz="3200">
-                <a:solidFill>
-                  <a:schemeClr val="tx2"/>
-                </a:solidFill>
-              </a:rPr>
-              <a:t> </a:t>
-            </a:r>
-            <a:r>
-              <a:rPr lang="en-US" sz="3200"/>
-              <a:t>objects are often</a:t>
-            </a:r>
-            <a:r>
-              <a:rPr lang="en-US" sz="3200"/>
-              <a:t> </a:t>
-            </a:r>
-            <a:r>
-              <a:rPr lang="en-US" sz="3200" i="1" smtClean="0">
-                <a:solidFill>
-                  <a:schemeClr val="tx2"/>
-                </a:solidFill>
-              </a:rPr>
-              <a:t>Singletons</a:t>
-            </a:r>
-            <a:r>
-              <a:rPr lang="en-US" sz="3200" smtClean="0"/>
-              <a:t>.</a:t>
+              <a:rPr lang="en-US" sz="3200" smtClean="0">
+                <a:cs typeface="Courier New" panose="02070309020205020404" pitchFamily="49" charset="0"/>
+              </a:rPr>
+              <a:t>has the same interface as the system it substitutes, so they can be used interchangeably. </a:t>
             </a:r>
             <a:endParaRPr lang="ru-RU" sz="3200">
               <a:cs typeface="Courier New" panose="02070309020205020404" pitchFamily="49" charset="0"/>
@@ -14790,14 +14684,14 @@
       </p:sp>
       <p:sp>
         <p:nvSpPr>
-          <p:cNvPr id="11" name="TextBox 10"/>
+          <p:cNvPr id="12" name="TextBox 11"/>
           <p:cNvSpPr txBox="1"/>
           <p:nvPr/>
         </p:nvSpPr>
         <p:spPr>
           <a:xfrm>
-            <a:off x="4892094" y="6165304"/>
-            <a:ext cx="4288418" cy="369332"/>
+            <a:off x="1570672" y="6228020"/>
+            <a:ext cx="7648312" cy="369332"/>
           </a:xfrm>
           <a:prstGeom prst="rect">
             <a:avLst/>
@@ -14828,17 +14722,27 @@
                   </a:schemeClr>
                 </a:solidFill>
               </a:rPr>
-              <a:t>ource: GoF book, </a:t>
-            </a:r>
-            <a:r>
-              <a:rPr lang="en-US" smtClean="0">
+              <a:t>ource: Design Patterns Explained Simply by Alexander Shvets, pg. 2</a:t>
+            </a:r>
+            <a:r>
+              <a:rPr lang="uk-UA" smtClean="0">
                 <a:solidFill>
                   <a:schemeClr val="accent6">
                     <a:lumMod val="75000"/>
                   </a:schemeClr>
                 </a:solidFill>
               </a:rPr>
-              <a:t>Facade, Applicability</a:t>
+              <a:t>1</a:t>
+            </a:r>
+            <a:r>
+              <a:rPr lang="en-US">
+                <a:solidFill>
+                  <a:schemeClr val="accent6">
+                    <a:lumMod val="75000"/>
+                  </a:schemeClr>
+                </a:solidFill>
+              </a:rPr>
+              <a:t>5</a:t>
             </a:r>
             <a:endParaRPr lang="en-US" u="sng">
               <a:solidFill>
@@ -14853,7 +14757,7 @@
     </p:spTree>
     <p:extLst>
       <p:ext uri="{BB962C8B-B14F-4D97-AF65-F5344CB8AC3E}">
-        <p14:creationId xmlns:p14="http://schemas.microsoft.com/office/powerpoint/2010/main" val="1367703513"/>
+        <p14:creationId xmlns:p14="http://schemas.microsoft.com/office/powerpoint/2010/main" val="98946137"/>
       </p:ext>
     </p:extLst>
   </p:cSld>
@@ -15253,7 +15157,11 @@
           </a:lstStyle>
           <a:p>
             <a:r>
-              <a:rPr lang="en-US" sz="3200" b="1" i="1" smtClean="0">
+              <a:rPr lang="en-US" sz="3200"/>
+              <a:t>Usually only one </a:t>
+            </a:r>
+            <a:r>
+              <a:rPr lang="en-US" sz="3200" b="1" i="1">
                 <a:solidFill>
                   <a:schemeClr val="tx2"/>
                 </a:solidFill>
@@ -15261,67 +15169,48 @@
               <a:t>Facade</a:t>
             </a:r>
             <a:r>
+              <a:rPr lang="en-US" sz="3200">
+                <a:solidFill>
+                  <a:schemeClr val="tx2"/>
+                </a:solidFill>
+              </a:rPr>
+              <a:t> </a:t>
+            </a:r>
+            <a:r>
+              <a:rPr lang="en-US" sz="3200"/>
+              <a:t>object is required. Thus </a:t>
+            </a:r>
+            <a:r>
+              <a:rPr lang="en-US" sz="3200" b="1" i="1">
+                <a:solidFill>
+                  <a:schemeClr val="tx2"/>
+                </a:solidFill>
+              </a:rPr>
+              <a:t>Facade</a:t>
+            </a:r>
+            <a:r>
+              <a:rPr lang="en-US" sz="3200">
+                <a:solidFill>
+                  <a:schemeClr val="tx2"/>
+                </a:solidFill>
+              </a:rPr>
+              <a:t> </a:t>
+            </a:r>
+            <a:r>
+              <a:rPr lang="en-US" sz="3200"/>
+              <a:t>objects are often </a:t>
+            </a:r>
+            <a:r>
+              <a:rPr lang="en-US" sz="3200" i="1" smtClean="0">
+                <a:solidFill>
+                  <a:schemeClr val="tx2"/>
+                </a:solidFill>
+              </a:rPr>
+              <a:t>Singletons</a:t>
+            </a:r>
+            <a:r>
               <a:rPr lang="en-US" sz="3200" smtClean="0"/>
-              <a:t> is similar to </a:t>
-            </a:r>
-            <a:r>
-              <a:rPr lang="en-US" sz="3200" i="1" smtClean="0">
-                <a:solidFill>
-                  <a:schemeClr val="tx2"/>
-                </a:solidFill>
-              </a:rPr>
-              <a:t>Proxy</a:t>
-            </a:r>
-            <a:r>
-              <a:rPr lang="en-US" sz="3200" smtClean="0"/>
-              <a:t>, because it substitutes a complex system and can initialize it.</a:t>
-            </a:r>
-          </a:p>
-          <a:p>
-            <a:r>
-              <a:rPr lang="en-US" sz="3200" smtClean="0">
-                <a:cs typeface="Courier New" panose="02070309020205020404" pitchFamily="49" charset="0"/>
-              </a:rPr>
-              <a:t>However, unlike </a:t>
-            </a:r>
-            <a:r>
-              <a:rPr lang="en-US" sz="3200" i="1" smtClean="0">
-                <a:solidFill>
-                  <a:schemeClr val="tx2"/>
-                </a:solidFill>
-                <a:cs typeface="Courier New" panose="02070309020205020404" pitchFamily="49" charset="0"/>
-              </a:rPr>
-              <a:t>Facade</a:t>
-            </a:r>
-            <a:r>
-              <a:rPr lang="en-US" sz="3200" smtClean="0">
-                <a:cs typeface="Courier New" panose="02070309020205020404" pitchFamily="49" charset="0"/>
-              </a:rPr>
-              <a:t>, </a:t>
-            </a:r>
-            <a:r>
-              <a:rPr lang="en-US" sz="3200" i="1" smtClean="0">
-                <a:solidFill>
-                  <a:schemeClr val="tx2"/>
-                </a:solidFill>
-                <a:cs typeface="Courier New" panose="02070309020205020404" pitchFamily="49" charset="0"/>
-              </a:rPr>
-              <a:t>Proxy</a:t>
-            </a:r>
-            <a:r>
-              <a:rPr lang="en-US" sz="3200" smtClean="0">
-                <a:solidFill>
-                  <a:schemeClr val="tx2"/>
-                </a:solidFill>
-                <a:cs typeface="Courier New" panose="02070309020205020404" pitchFamily="49" charset="0"/>
-              </a:rPr>
-              <a:t> </a:t>
-            </a:r>
-            <a:r>
-              <a:rPr lang="en-US" sz="3200" smtClean="0">
-                <a:cs typeface="Courier New" panose="02070309020205020404" pitchFamily="49" charset="0"/>
-              </a:rPr>
-              <a:t>has the same interface as the system it substitutes, so they can be used interchangeably. </a:t>
+              <a:t>.</a:t>
             </a:r>
             <a:endParaRPr lang="ru-RU" sz="3200">
               <a:cs typeface="Courier New" panose="02070309020205020404" pitchFamily="49" charset="0"/>
@@ -15331,14 +15220,14 @@
       </p:sp>
       <p:sp>
         <p:nvSpPr>
-          <p:cNvPr id="11" name="TextBox 10"/>
+          <p:cNvPr id="12" name="TextBox 11"/>
           <p:cNvSpPr txBox="1"/>
           <p:nvPr/>
         </p:nvSpPr>
         <p:spPr>
           <a:xfrm>
-            <a:off x="4892094" y="6165304"/>
-            <a:ext cx="4288418" cy="369332"/>
+            <a:off x="4404846" y="6165304"/>
+            <a:ext cx="4775666" cy="369332"/>
           </a:xfrm>
           <a:prstGeom prst="rect">
             <a:avLst/>
@@ -15369,7 +15258,7 @@
                   </a:schemeClr>
                 </a:solidFill>
               </a:rPr>
-              <a:t>ource: GoF book, </a:t>
+              <a:t>ource: GoF book, Facade, </a:t>
             </a:r>
             <a:r>
               <a:rPr lang="en-US" smtClean="0">
@@ -15379,7 +15268,7 @@
                   </a:schemeClr>
                 </a:solidFill>
               </a:rPr>
-              <a:t>Facade, Applicability</a:t>
+              <a:t>Related patterns</a:t>
             </a:r>
             <a:endParaRPr lang="en-US" u="sng">
               <a:solidFill>
@@ -15394,7 +15283,7 @@
     </p:spTree>
     <p:extLst>
       <p:ext uri="{BB962C8B-B14F-4D97-AF65-F5344CB8AC3E}">
-        <p14:creationId xmlns:p14="http://schemas.microsoft.com/office/powerpoint/2010/main" val="98946137"/>
+        <p14:creationId xmlns:p14="http://schemas.microsoft.com/office/powerpoint/2010/main" val="1367703513"/>
       </p:ext>
     </p:extLst>
   </p:cSld>
@@ -15831,11 +15720,7 @@
             </a:r>
             <a:r>
               <a:rPr lang="en-US" sz="3200"/>
-              <a:t>in that </a:t>
-            </a:r>
-            <a:r>
-              <a:rPr lang="en-US" sz="3200"/>
-              <a:t>it </a:t>
+              <a:t>in that it </a:t>
             </a:r>
             <a:r>
               <a:rPr lang="en-US" sz="3200" smtClean="0"/>
@@ -15859,11 +15744,7 @@
             </a:r>
             <a:r>
               <a:rPr lang="en-US" sz="3200"/>
-              <a:t>existing </a:t>
-            </a:r>
-            <a:r>
-              <a:rPr lang="en-US" sz="3200"/>
-              <a:t>classes</a:t>
+              <a:t>existing classes</a:t>
             </a:r>
             <a:r>
               <a:rPr lang="en-US" sz="3200" smtClean="0"/>
@@ -15957,14 +15838,14 @@
       </p:sp>
       <p:sp>
         <p:nvSpPr>
-          <p:cNvPr id="11" name="TextBox 10"/>
+          <p:cNvPr id="12" name="TextBox 11"/>
           <p:cNvSpPr txBox="1"/>
           <p:nvPr/>
         </p:nvSpPr>
         <p:spPr>
           <a:xfrm>
-            <a:off x="4892094" y="6165304"/>
-            <a:ext cx="4288418" cy="369332"/>
+            <a:off x="4404846" y="6165304"/>
+            <a:ext cx="4775666" cy="369332"/>
           </a:xfrm>
           <a:prstGeom prst="rect">
             <a:avLst/>
@@ -15995,7 +15876,7 @@
                   </a:schemeClr>
                 </a:solidFill>
               </a:rPr>
-              <a:t>ource: GoF book, </a:t>
+              <a:t>ource: GoF book, Facade, </a:t>
             </a:r>
             <a:r>
               <a:rPr lang="en-US" smtClean="0">
@@ -16005,7 +15886,7 @@
                   </a:schemeClr>
                 </a:solidFill>
               </a:rPr>
-              <a:t>Facade, Applicability</a:t>
+              <a:t>Related patterns</a:t>
             </a:r>
             <a:endParaRPr lang="en-US" u="sng">
               <a:solidFill>
@@ -16201,16 +16082,82 @@
           </a:p>
         </p:txBody>
       </p:sp>
+      <p:sp>
+        <p:nvSpPr>
+          <p:cNvPr id="3" name="Объект 2"/>
+          <p:cNvSpPr>
+            <a:spLocks noGrp="1"/>
+          </p:cNvSpPr>
+          <p:nvPr>
+            <p:ph idx="1"/>
+          </p:nvPr>
+        </p:nvSpPr>
+        <p:spPr>
+          <a:xfrm>
+            <a:off x="498629" y="1936576"/>
+            <a:ext cx="8229600" cy="3940696"/>
+          </a:xfrm>
+        </p:spPr>
+        <p:txBody>
+          <a:bodyPr>
+            <a:normAutofit/>
+          </a:bodyPr>
+          <a:lstStyle/>
+          <a:p>
+            <a:r>
+              <a:rPr lang="en-US" sz="3200"/>
+              <a:t>Design Patterns Explained Simply by Alexander </a:t>
+            </a:r>
+            <a:r>
+              <a:rPr lang="en-US" sz="3200" smtClean="0"/>
+              <a:t>Shvets; pg. 206-216</a:t>
+            </a:r>
+            <a:r>
+              <a:rPr lang="en-US" sz="3200" smtClean="0">
+                <a:solidFill>
+                  <a:schemeClr val="accent6">
+                    <a:lumMod val="75000"/>
+                  </a:schemeClr>
+                </a:solidFill>
+              </a:rPr>
+              <a:t>.</a:t>
+            </a:r>
+          </a:p>
+          <a:p>
+            <a:r>
+              <a:rPr lang="en-US" sz="3200" smtClean="0"/>
+              <a:t>Design patterns: Elements of Reusable Object-Oriented Software by </a:t>
+            </a:r>
+            <a:r>
+              <a:rPr lang="en-US" sz="3200"/>
+              <a:t>Erich Gamma, Richard Helm, Ralph Johnson and John </a:t>
+            </a:r>
+            <a:r>
+              <a:rPr lang="en-US" sz="3200" smtClean="0"/>
+              <a:t>Vlissides; </a:t>
+            </a:r>
+            <a:r>
+              <a:rPr lang="en-US" sz="3200" smtClean="0"/>
+              <a:t>Facade </a:t>
+            </a:r>
+            <a:r>
+              <a:rPr lang="en-US" sz="3200" smtClean="0"/>
+              <a:t>and Pattern map.</a:t>
+            </a:r>
+            <a:endParaRPr lang="ru-RU" sz="3200"/>
+          </a:p>
+        </p:txBody>
+      </p:sp>
       <p:pic>
         <p:nvPicPr>
-          <p:cNvPr id="6" name="Рисунок 5"/>
+          <p:cNvPr id="10" name="Рисунок 9"/>
           <p:cNvPicPr>
             <a:picLocks noChangeAspect="1"/>
           </p:cNvPicPr>
           <p:nvPr/>
         </p:nvPicPr>
         <p:blipFill>
-          <a:blip r:embed="rId3">
+          <a:blip r:embed="rId3" cstate="print">
             <a:extLst>
               <a:ext uri="{28A0092B-C50C-407E-A947-70E740481C1C}">
                 <a14:useLocalDpi xmlns:a14="http://schemas.microsoft.com/office/drawing/2010/main" val="0"/>
@@ -16223,95 +16170,14 @@
         </p:blipFill>
         <p:spPr>
           <a:xfrm>
-            <a:off x="7540630" y="404665"/>
-            <a:ext cx="1572745" cy="1152127"/>
+            <a:off x="7524328" y="417440"/>
+            <a:ext cx="1462059" cy="1139352"/>
           </a:xfrm>
           <a:prstGeom prst="rect">
             <a:avLst/>
           </a:prstGeom>
         </p:spPr>
       </p:pic>
-      <p:sp>
-        <p:nvSpPr>
-          <p:cNvPr id="3" name="Объект 2"/>
-          <p:cNvSpPr>
-            <a:spLocks noGrp="1"/>
-          </p:cNvSpPr>
-          <p:nvPr>
-            <p:ph idx="1"/>
-          </p:nvPr>
-        </p:nvSpPr>
-        <p:spPr>
-          <a:xfrm>
-            <a:off x="498629" y="1936576"/>
-            <a:ext cx="8229600" cy="3940696"/>
-          </a:xfrm>
-        </p:spPr>
-        <p:txBody>
-          <a:bodyPr>
-            <a:normAutofit/>
-          </a:bodyPr>
-          <a:lstStyle/>
-          <a:p>
-            <a:r>
-              <a:rPr lang="en-US" sz="3200"/>
-              <a:t>Design Patterns Explained Simply by Alexander </a:t>
-            </a:r>
-            <a:r>
-              <a:rPr lang="en-US" sz="3200" smtClean="0"/>
-              <a:t>Shvets; pg. </a:t>
-            </a:r>
-            <a:r>
-              <a:rPr lang="en-US" sz="3200" smtClean="0"/>
-              <a:t>206</a:t>
-            </a:r>
-            <a:r>
-              <a:rPr lang="en-US" sz="3200" smtClean="0"/>
-              <a:t>-216</a:t>
-            </a:r>
-            <a:r>
-              <a:rPr lang="en-US" sz="3200" smtClean="0">
-                <a:solidFill>
-                  <a:schemeClr val="accent6">
-                    <a:lumMod val="75000"/>
-                  </a:schemeClr>
-                </a:solidFill>
-              </a:rPr>
-              <a:t>.</a:t>
-            </a:r>
-            <a:endParaRPr lang="en-US" sz="3200" smtClean="0">
-              <a:solidFill>
-                <a:schemeClr val="accent6">
-                  <a:lumMod val="75000"/>
-                </a:schemeClr>
-              </a:solidFill>
-            </a:endParaRPr>
-          </a:p>
-          <a:p>
-            <a:r>
-              <a:rPr lang="en-US" sz="3200" smtClean="0"/>
-              <a:t>Design patterns: Elements of Reusable Object-Oriented Software by </a:t>
-            </a:r>
-            <a:r>
-              <a:rPr lang="en-US" sz="3200"/>
-              <a:t>Erich Gamma, Richard Helm, Ralph Johnson and John </a:t>
-            </a:r>
-            <a:r>
-              <a:rPr lang="en-US" sz="3200" smtClean="0"/>
-              <a:t>Vlissides; </a:t>
-            </a:r>
-            <a:r>
-              <a:rPr lang="en-US" sz="3200" smtClean="0"/>
-              <a:t>Façade and </a:t>
-            </a:r>
-            <a:r>
-              <a:rPr lang="en-US" sz="3200" smtClean="0"/>
-              <a:t>Pattern map.</a:t>
-            </a:r>
-            <a:endParaRPr lang="ru-RU" sz="3200"/>
-          </a:p>
-        </p:txBody>
-      </p:sp>
     </p:spTree>
     <p:extLst>
       <p:ext uri="{BB962C8B-B14F-4D97-AF65-F5344CB8AC3E}">
@@ -16478,7 +16344,7 @@
         </p:nvSpPr>
         <p:spPr>
           <a:xfrm>
-            <a:off x="2123728" y="1268760"/>
+            <a:off x="2123728" y="620688"/>
             <a:ext cx="5112568" cy="3600400"/>
           </a:xfrm>
         </p:spPr>
@@ -16503,6 +16369,36 @@
           </a:p>
         </p:txBody>
       </p:sp>
+      <p:pic>
+        <p:nvPicPr>
+          <p:cNvPr id="2" name="Рисунок 1"/>
+          <p:cNvPicPr>
+            <a:picLocks noChangeAspect="1"/>
+          </p:cNvPicPr>
+          <p:nvPr/>
+        </p:nvPicPr>
+        <p:blipFill>
+          <a:blip r:embed="rId3">
+            <a:extLst>
+              <a:ext uri="{28A0092B-C50C-407E-A947-70E740481C1C}">
+                <a14:useLocalDpi xmlns:a14="http://schemas.microsoft.com/office/drawing/2010/main" val="0"/>
+              </a:ext>
+            </a:extLst>
+          </a:blip>
+          <a:stretch>
+            <a:fillRect/>
+          </a:stretch>
+        </p:blipFill>
+        <p:spPr>
+          <a:xfrm>
+            <a:off x="3311184" y="3645024"/>
+            <a:ext cx="2604490" cy="2029625"/>
+          </a:xfrm>
+          <a:prstGeom prst="rect">
+            <a:avLst/>
+          </a:prstGeom>
+        </p:spPr>
+      </p:pic>
     </p:spTree>
     <p:extLst>
       <p:ext uri="{BB962C8B-B14F-4D97-AF65-F5344CB8AC3E}">

</xml_diff>

<commit_message>
Fix page numbers in presentations
Signed-off-by: Polina Shlepakova <polinashlepakova@gmail.com>
</commit_message>
<xml_diff>
--- a/Facade/Presentation/Facade.pptx
+++ b/Facade/Presentation/Facade.pptx
@@ -7273,8 +7273,8 @@
         </p:nvSpPr>
         <p:spPr>
           <a:xfrm>
-            <a:off x="8479868" y="6488668"/>
-            <a:ext cx="633507" cy="369332"/>
+            <a:off x="8346757" y="6488668"/>
+            <a:ext cx="761747" cy="369332"/>
           </a:xfrm>
           <a:prstGeom prst="rect">
             <a:avLst/>
@@ -7293,8 +7293,21 @@
                   <a:srgbClr val="002060"/>
                 </a:solidFill>
               </a:rPr>
-              <a:t>2/20</a:t>
-            </a:r>
+              <a:t>10</a:t>
+            </a:r>
+            <a:r>
+              <a:rPr lang="en-US" smtClean="0">
+                <a:solidFill>
+                  <a:srgbClr val="002060"/>
+                </a:solidFill>
+              </a:rPr>
+              <a:t>/28</a:t>
+            </a:r>
+            <a:endParaRPr lang="en-US" smtClean="0">
+              <a:solidFill>
+                <a:srgbClr val="002060"/>
+              </a:solidFill>
+            </a:endParaRPr>
           </a:p>
         </p:txBody>
       </p:sp>
@@ -7723,39 +7736,6 @@
           </a:p>
         </p:txBody>
       </p:sp>
-      <p:sp>
-        <p:nvSpPr>
-          <p:cNvPr id="9" name="TextBox 8"/>
-          <p:cNvSpPr txBox="1"/>
-          <p:nvPr/>
-        </p:nvSpPr>
-        <p:spPr>
-          <a:xfrm>
-            <a:off x="8479868" y="6488668"/>
-            <a:ext cx="633507" cy="369332"/>
-          </a:xfrm>
-          <a:prstGeom prst="rect">
-            <a:avLst/>
-          </a:prstGeom>
-          <a:noFill/>
-        </p:spPr>
-        <p:txBody>
-          <a:bodyPr wrap="none" rtlCol="0">
-            <a:spAutoFit/>
-          </a:bodyPr>
-          <a:lstStyle/>
-          <a:p>
-            <a:r>
-              <a:rPr lang="en-US" smtClean="0">
-                <a:solidFill>
-                  <a:srgbClr val="002060"/>
-                </a:solidFill>
-              </a:rPr>
-              <a:t>2/20</a:t>
-            </a:r>
-          </a:p>
-        </p:txBody>
-      </p:sp>
       <p:pic>
         <p:nvPicPr>
           <p:cNvPr id="3" name="Рисунок 2"/>
@@ -8013,6 +7993,52 @@
               <a:t>bd52699</a:t>
             </a:r>
             <a:endParaRPr lang="ru-RU"/>
+          </a:p>
+        </p:txBody>
+      </p:sp>
+      <p:sp>
+        <p:nvSpPr>
+          <p:cNvPr id="12" name="TextBox 11"/>
+          <p:cNvSpPr txBox="1"/>
+          <p:nvPr/>
+        </p:nvSpPr>
+        <p:spPr>
+          <a:xfrm>
+            <a:off x="8346757" y="6488668"/>
+            <a:ext cx="744627" cy="369332"/>
+          </a:xfrm>
+          <a:prstGeom prst="rect">
+            <a:avLst/>
+          </a:prstGeom>
+          <a:noFill/>
+        </p:spPr>
+        <p:txBody>
+          <a:bodyPr wrap="none" rtlCol="0">
+            <a:spAutoFit/>
+          </a:bodyPr>
+          <a:lstStyle/>
+          <a:p>
+            <a:r>
+              <a:rPr lang="en-US" smtClean="0">
+                <a:solidFill>
+                  <a:srgbClr val="002060"/>
+                </a:solidFill>
+              </a:rPr>
+              <a:t>11</a:t>
+            </a:r>
+            <a:r>
+              <a:rPr lang="en-US" smtClean="0">
+                <a:solidFill>
+                  <a:srgbClr val="002060"/>
+                </a:solidFill>
+              </a:rPr>
+              <a:t>/28</a:t>
+            </a:r>
+            <a:endParaRPr lang="en-US" smtClean="0">
+              <a:solidFill>
+                <a:srgbClr val="002060"/>
+              </a:solidFill>
+            </a:endParaRPr>
           </a:p>
         </p:txBody>
       </p:sp>
@@ -8169,39 +8195,6 @@
           </a:p>
         </p:txBody>
       </p:sp>
-      <p:sp>
-        <p:nvSpPr>
-          <p:cNvPr id="9" name="TextBox 8"/>
-          <p:cNvSpPr txBox="1"/>
-          <p:nvPr/>
-        </p:nvSpPr>
-        <p:spPr>
-          <a:xfrm>
-            <a:off x="8479868" y="6488668"/>
-            <a:ext cx="633507" cy="369332"/>
-          </a:xfrm>
-          <a:prstGeom prst="rect">
-            <a:avLst/>
-          </a:prstGeom>
-          <a:noFill/>
-        </p:spPr>
-        <p:txBody>
-          <a:bodyPr wrap="none" rtlCol="0">
-            <a:spAutoFit/>
-          </a:bodyPr>
-          <a:lstStyle/>
-          <a:p>
-            <a:r>
-              <a:rPr lang="en-US" smtClean="0">
-                <a:solidFill>
-                  <a:srgbClr val="002060"/>
-                </a:solidFill>
-              </a:rPr>
-              <a:t>2/20</a:t>
-            </a:r>
-          </a:p>
-        </p:txBody>
-      </p:sp>
       <p:pic>
         <p:nvPicPr>
           <p:cNvPr id="3" name="Рисунок 2"/>
@@ -8538,6 +8531,52 @@
             <a:endParaRPr lang="ru-RU">
               <a:latin typeface="Courier New" panose="02070309020205020404" pitchFamily="49" charset="0"/>
               <a:cs typeface="Courier New" panose="02070309020205020404" pitchFamily="49" charset="0"/>
+            </a:endParaRPr>
+          </a:p>
+        </p:txBody>
+      </p:sp>
+      <p:sp>
+        <p:nvSpPr>
+          <p:cNvPr id="11" name="TextBox 10"/>
+          <p:cNvSpPr txBox="1"/>
+          <p:nvPr/>
+        </p:nvSpPr>
+        <p:spPr>
+          <a:xfrm>
+            <a:off x="8346757" y="6488668"/>
+            <a:ext cx="761747" cy="369332"/>
+          </a:xfrm>
+          <a:prstGeom prst="rect">
+            <a:avLst/>
+          </a:prstGeom>
+          <a:noFill/>
+        </p:spPr>
+        <p:txBody>
+          <a:bodyPr wrap="none" rtlCol="0">
+            <a:spAutoFit/>
+          </a:bodyPr>
+          <a:lstStyle/>
+          <a:p>
+            <a:r>
+              <a:rPr lang="en-US" smtClean="0">
+                <a:solidFill>
+                  <a:srgbClr val="002060"/>
+                </a:solidFill>
+              </a:rPr>
+              <a:t>12</a:t>
+            </a:r>
+            <a:r>
+              <a:rPr lang="en-US" smtClean="0">
+                <a:solidFill>
+                  <a:srgbClr val="002060"/>
+                </a:solidFill>
+              </a:rPr>
+              <a:t>/28</a:t>
+            </a:r>
+            <a:endParaRPr lang="en-US" smtClean="0">
+              <a:solidFill>
+                <a:srgbClr val="002060"/>
+              </a:solidFill>
             </a:endParaRPr>
           </a:p>
         </p:txBody>
@@ -8695,39 +8734,6 @@
           </a:p>
         </p:txBody>
       </p:sp>
-      <p:sp>
-        <p:nvSpPr>
-          <p:cNvPr id="9" name="TextBox 8"/>
-          <p:cNvSpPr txBox="1"/>
-          <p:nvPr/>
-        </p:nvSpPr>
-        <p:spPr>
-          <a:xfrm>
-            <a:off x="8479868" y="6488668"/>
-            <a:ext cx="633507" cy="369332"/>
-          </a:xfrm>
-          <a:prstGeom prst="rect">
-            <a:avLst/>
-          </a:prstGeom>
-          <a:noFill/>
-        </p:spPr>
-        <p:txBody>
-          <a:bodyPr wrap="none" rtlCol="0">
-            <a:spAutoFit/>
-          </a:bodyPr>
-          <a:lstStyle/>
-          <a:p>
-            <a:r>
-              <a:rPr lang="en-US" smtClean="0">
-                <a:solidFill>
-                  <a:srgbClr val="002060"/>
-                </a:solidFill>
-              </a:rPr>
-              <a:t>2/20</a:t>
-            </a:r>
-          </a:p>
-        </p:txBody>
-      </p:sp>
       <p:pic>
         <p:nvPicPr>
           <p:cNvPr id="3" name="Рисунок 2"/>
@@ -9000,6 +9006,52 @@
             <a:endParaRPr lang="ru-RU">
               <a:latin typeface="Courier New" panose="02070309020205020404" pitchFamily="49" charset="0"/>
               <a:cs typeface="Courier New" panose="02070309020205020404" pitchFamily="49" charset="0"/>
+            </a:endParaRPr>
+          </a:p>
+        </p:txBody>
+      </p:sp>
+      <p:sp>
+        <p:nvSpPr>
+          <p:cNvPr id="11" name="TextBox 10"/>
+          <p:cNvSpPr txBox="1"/>
+          <p:nvPr/>
+        </p:nvSpPr>
+        <p:spPr>
+          <a:xfrm>
+            <a:off x="8346757" y="6488668"/>
+            <a:ext cx="761747" cy="369332"/>
+          </a:xfrm>
+          <a:prstGeom prst="rect">
+            <a:avLst/>
+          </a:prstGeom>
+          <a:noFill/>
+        </p:spPr>
+        <p:txBody>
+          <a:bodyPr wrap="none" rtlCol="0">
+            <a:spAutoFit/>
+          </a:bodyPr>
+          <a:lstStyle/>
+          <a:p>
+            <a:r>
+              <a:rPr lang="en-US" smtClean="0">
+                <a:solidFill>
+                  <a:srgbClr val="002060"/>
+                </a:solidFill>
+              </a:rPr>
+              <a:t>13</a:t>
+            </a:r>
+            <a:r>
+              <a:rPr lang="en-US" smtClean="0">
+                <a:solidFill>
+                  <a:srgbClr val="002060"/>
+                </a:solidFill>
+              </a:rPr>
+              <a:t>/28</a:t>
+            </a:r>
+            <a:endParaRPr lang="en-US" smtClean="0">
+              <a:solidFill>
+                <a:srgbClr val="002060"/>
+              </a:solidFill>
             </a:endParaRPr>
           </a:p>
         </p:txBody>
@@ -9153,39 +9205,6 @@
           </a:p>
         </p:txBody>
       </p:sp>
-      <p:sp>
-        <p:nvSpPr>
-          <p:cNvPr id="9" name="TextBox 8"/>
-          <p:cNvSpPr txBox="1"/>
-          <p:nvPr/>
-        </p:nvSpPr>
-        <p:spPr>
-          <a:xfrm>
-            <a:off x="8479868" y="6488668"/>
-            <a:ext cx="633507" cy="369332"/>
-          </a:xfrm>
-          <a:prstGeom prst="rect">
-            <a:avLst/>
-          </a:prstGeom>
-          <a:noFill/>
-        </p:spPr>
-        <p:txBody>
-          <a:bodyPr wrap="none" rtlCol="0">
-            <a:spAutoFit/>
-          </a:bodyPr>
-          <a:lstStyle/>
-          <a:p>
-            <a:r>
-              <a:rPr lang="en-US" smtClean="0">
-                <a:solidFill>
-                  <a:srgbClr val="002060"/>
-                </a:solidFill>
-              </a:rPr>
-              <a:t>2/20</a:t>
-            </a:r>
-          </a:p>
-        </p:txBody>
-      </p:sp>
       <p:pic>
         <p:nvPicPr>
           <p:cNvPr id="3" name="Рисунок 2"/>
@@ -9443,6 +9462,52 @@
               <a:t>71c3282</a:t>
             </a:r>
             <a:endParaRPr lang="ru-RU"/>
+          </a:p>
+        </p:txBody>
+      </p:sp>
+      <p:sp>
+        <p:nvSpPr>
+          <p:cNvPr id="11" name="TextBox 10"/>
+          <p:cNvSpPr txBox="1"/>
+          <p:nvPr/>
+        </p:nvSpPr>
+        <p:spPr>
+          <a:xfrm>
+            <a:off x="8346757" y="6488668"/>
+            <a:ext cx="761747" cy="369332"/>
+          </a:xfrm>
+          <a:prstGeom prst="rect">
+            <a:avLst/>
+          </a:prstGeom>
+          <a:noFill/>
+        </p:spPr>
+        <p:txBody>
+          <a:bodyPr wrap="none" rtlCol="0">
+            <a:spAutoFit/>
+          </a:bodyPr>
+          <a:lstStyle/>
+          <a:p>
+            <a:r>
+              <a:rPr lang="en-US" smtClean="0">
+                <a:solidFill>
+                  <a:srgbClr val="002060"/>
+                </a:solidFill>
+              </a:rPr>
+              <a:t>14</a:t>
+            </a:r>
+            <a:r>
+              <a:rPr lang="en-US" smtClean="0">
+                <a:solidFill>
+                  <a:srgbClr val="002060"/>
+                </a:solidFill>
+              </a:rPr>
+              <a:t>/28</a:t>
+            </a:r>
+            <a:endParaRPr lang="en-US" smtClean="0">
+              <a:solidFill>
+                <a:srgbClr val="002060"/>
+              </a:solidFill>
+            </a:endParaRPr>
           </a:p>
         </p:txBody>
       </p:sp>
@@ -9599,39 +9664,6 @@
           </a:p>
         </p:txBody>
       </p:sp>
-      <p:sp>
-        <p:nvSpPr>
-          <p:cNvPr id="9" name="TextBox 8"/>
-          <p:cNvSpPr txBox="1"/>
-          <p:nvPr/>
-        </p:nvSpPr>
-        <p:spPr>
-          <a:xfrm>
-            <a:off x="8479868" y="6488668"/>
-            <a:ext cx="633507" cy="369332"/>
-          </a:xfrm>
-          <a:prstGeom prst="rect">
-            <a:avLst/>
-          </a:prstGeom>
-          <a:noFill/>
-        </p:spPr>
-        <p:txBody>
-          <a:bodyPr wrap="none" rtlCol="0">
-            <a:spAutoFit/>
-          </a:bodyPr>
-          <a:lstStyle/>
-          <a:p>
-            <a:r>
-              <a:rPr lang="en-US" smtClean="0">
-                <a:solidFill>
-                  <a:srgbClr val="002060"/>
-                </a:solidFill>
-              </a:rPr>
-              <a:t>2/20</a:t>
-            </a:r>
-          </a:p>
-        </p:txBody>
-      </p:sp>
       <p:pic>
         <p:nvPicPr>
           <p:cNvPr id="3" name="Рисунок 2"/>
@@ -9915,6 +9947,52 @@
             <a:endParaRPr lang="ru-RU">
               <a:latin typeface="Courier New" panose="02070309020205020404" pitchFamily="49" charset="0"/>
               <a:cs typeface="Courier New" panose="02070309020205020404" pitchFamily="49" charset="0"/>
+            </a:endParaRPr>
+          </a:p>
+        </p:txBody>
+      </p:sp>
+      <p:sp>
+        <p:nvSpPr>
+          <p:cNvPr id="11" name="TextBox 10"/>
+          <p:cNvSpPr txBox="1"/>
+          <p:nvPr/>
+        </p:nvSpPr>
+        <p:spPr>
+          <a:xfrm>
+            <a:off x="8346757" y="6488668"/>
+            <a:ext cx="761747" cy="369332"/>
+          </a:xfrm>
+          <a:prstGeom prst="rect">
+            <a:avLst/>
+          </a:prstGeom>
+          <a:noFill/>
+        </p:spPr>
+        <p:txBody>
+          <a:bodyPr wrap="none" rtlCol="0">
+            <a:spAutoFit/>
+          </a:bodyPr>
+          <a:lstStyle/>
+          <a:p>
+            <a:r>
+              <a:rPr lang="en-US" smtClean="0">
+                <a:solidFill>
+                  <a:srgbClr val="002060"/>
+                </a:solidFill>
+              </a:rPr>
+              <a:t>15</a:t>
+            </a:r>
+            <a:r>
+              <a:rPr lang="en-US" smtClean="0">
+                <a:solidFill>
+                  <a:srgbClr val="002060"/>
+                </a:solidFill>
+              </a:rPr>
+              <a:t>/28</a:t>
+            </a:r>
+            <a:endParaRPr lang="en-US" smtClean="0">
+              <a:solidFill>
+                <a:srgbClr val="002060"/>
+              </a:solidFill>
             </a:endParaRPr>
           </a:p>
         </p:txBody>
@@ -10072,39 +10150,6 @@
           </a:p>
         </p:txBody>
       </p:sp>
-      <p:sp>
-        <p:nvSpPr>
-          <p:cNvPr id="9" name="TextBox 8"/>
-          <p:cNvSpPr txBox="1"/>
-          <p:nvPr/>
-        </p:nvSpPr>
-        <p:spPr>
-          <a:xfrm>
-            <a:off x="8479868" y="6488668"/>
-            <a:ext cx="633507" cy="369332"/>
-          </a:xfrm>
-          <a:prstGeom prst="rect">
-            <a:avLst/>
-          </a:prstGeom>
-          <a:noFill/>
-        </p:spPr>
-        <p:txBody>
-          <a:bodyPr wrap="none" rtlCol="0">
-            <a:spAutoFit/>
-          </a:bodyPr>
-          <a:lstStyle/>
-          <a:p>
-            <a:r>
-              <a:rPr lang="en-US" smtClean="0">
-                <a:solidFill>
-                  <a:srgbClr val="002060"/>
-                </a:solidFill>
-              </a:rPr>
-              <a:t>2/20</a:t>
-            </a:r>
-          </a:p>
-        </p:txBody>
-      </p:sp>
       <p:pic>
         <p:nvPicPr>
           <p:cNvPr id="3" name="Рисунок 2"/>
@@ -10377,6 +10422,52 @@
             <a:endParaRPr lang="ru-RU">
               <a:latin typeface="Courier New" panose="02070309020205020404" pitchFamily="49" charset="0"/>
               <a:cs typeface="Courier New" panose="02070309020205020404" pitchFamily="49" charset="0"/>
+            </a:endParaRPr>
+          </a:p>
+        </p:txBody>
+      </p:sp>
+      <p:sp>
+        <p:nvSpPr>
+          <p:cNvPr id="11" name="TextBox 10"/>
+          <p:cNvSpPr txBox="1"/>
+          <p:nvPr/>
+        </p:nvSpPr>
+        <p:spPr>
+          <a:xfrm>
+            <a:off x="8346757" y="6488668"/>
+            <a:ext cx="761747" cy="369332"/>
+          </a:xfrm>
+          <a:prstGeom prst="rect">
+            <a:avLst/>
+          </a:prstGeom>
+          <a:noFill/>
+        </p:spPr>
+        <p:txBody>
+          <a:bodyPr wrap="none" rtlCol="0">
+            <a:spAutoFit/>
+          </a:bodyPr>
+          <a:lstStyle/>
+          <a:p>
+            <a:r>
+              <a:rPr lang="en-US" smtClean="0">
+                <a:solidFill>
+                  <a:srgbClr val="002060"/>
+                </a:solidFill>
+              </a:rPr>
+              <a:t>16</a:t>
+            </a:r>
+            <a:r>
+              <a:rPr lang="en-US" smtClean="0">
+                <a:solidFill>
+                  <a:srgbClr val="002060"/>
+                </a:solidFill>
+              </a:rPr>
+              <a:t>/28</a:t>
+            </a:r>
+            <a:endParaRPr lang="en-US" smtClean="0">
+              <a:solidFill>
+                <a:srgbClr val="002060"/>
+              </a:solidFill>
             </a:endParaRPr>
           </a:p>
         </p:txBody>
@@ -10530,39 +10621,6 @@
           </a:p>
         </p:txBody>
       </p:sp>
-      <p:sp>
-        <p:nvSpPr>
-          <p:cNvPr id="9" name="TextBox 8"/>
-          <p:cNvSpPr txBox="1"/>
-          <p:nvPr/>
-        </p:nvSpPr>
-        <p:spPr>
-          <a:xfrm>
-            <a:off x="8479868" y="6488668"/>
-            <a:ext cx="633507" cy="369332"/>
-          </a:xfrm>
-          <a:prstGeom prst="rect">
-            <a:avLst/>
-          </a:prstGeom>
-          <a:noFill/>
-        </p:spPr>
-        <p:txBody>
-          <a:bodyPr wrap="none" rtlCol="0">
-            <a:spAutoFit/>
-          </a:bodyPr>
-          <a:lstStyle/>
-          <a:p>
-            <a:r>
-              <a:rPr lang="en-US" smtClean="0">
-                <a:solidFill>
-                  <a:srgbClr val="002060"/>
-                </a:solidFill>
-              </a:rPr>
-              <a:t>2/20</a:t>
-            </a:r>
-          </a:p>
-        </p:txBody>
-      </p:sp>
       <p:pic>
         <p:nvPicPr>
           <p:cNvPr id="3" name="Рисунок 2"/>
@@ -10880,6 +10938,52 @@
                 <a:schemeClr val="accent6">
                   <a:lumMod val="75000"/>
                 </a:schemeClr>
+              </a:solidFill>
+            </a:endParaRPr>
+          </a:p>
+        </p:txBody>
+      </p:sp>
+      <p:sp>
+        <p:nvSpPr>
+          <p:cNvPr id="12" name="TextBox 11"/>
+          <p:cNvSpPr txBox="1"/>
+          <p:nvPr/>
+        </p:nvSpPr>
+        <p:spPr>
+          <a:xfrm>
+            <a:off x="8346757" y="6488668"/>
+            <a:ext cx="761747" cy="369332"/>
+          </a:xfrm>
+          <a:prstGeom prst="rect">
+            <a:avLst/>
+          </a:prstGeom>
+          <a:noFill/>
+        </p:spPr>
+        <p:txBody>
+          <a:bodyPr wrap="none" rtlCol="0">
+            <a:spAutoFit/>
+          </a:bodyPr>
+          <a:lstStyle/>
+          <a:p>
+            <a:r>
+              <a:rPr lang="en-US" smtClean="0">
+                <a:solidFill>
+                  <a:srgbClr val="002060"/>
+                </a:solidFill>
+              </a:rPr>
+              <a:t>17</a:t>
+            </a:r>
+            <a:r>
+              <a:rPr lang="en-US" smtClean="0">
+                <a:solidFill>
+                  <a:srgbClr val="002060"/>
+                </a:solidFill>
+              </a:rPr>
+              <a:t>/28</a:t>
+            </a:r>
+            <a:endParaRPr lang="en-US" smtClean="0">
+              <a:solidFill>
+                <a:srgbClr val="002060"/>
               </a:solidFill>
             </a:endParaRPr>
           </a:p>
@@ -11034,39 +11138,6 @@
           </a:p>
         </p:txBody>
       </p:sp>
-      <p:sp>
-        <p:nvSpPr>
-          <p:cNvPr id="9" name="TextBox 8"/>
-          <p:cNvSpPr txBox="1"/>
-          <p:nvPr/>
-        </p:nvSpPr>
-        <p:spPr>
-          <a:xfrm>
-            <a:off x="8479868" y="6488668"/>
-            <a:ext cx="633507" cy="369332"/>
-          </a:xfrm>
-          <a:prstGeom prst="rect">
-            <a:avLst/>
-          </a:prstGeom>
-          <a:noFill/>
-        </p:spPr>
-        <p:txBody>
-          <a:bodyPr wrap="none" rtlCol="0">
-            <a:spAutoFit/>
-          </a:bodyPr>
-          <a:lstStyle/>
-          <a:p>
-            <a:r>
-              <a:rPr lang="en-US" smtClean="0">
-                <a:solidFill>
-                  <a:srgbClr val="002060"/>
-                </a:solidFill>
-              </a:rPr>
-              <a:t>2/20</a:t>
-            </a:r>
-          </a:p>
-        </p:txBody>
-      </p:sp>
       <p:pic>
         <p:nvPicPr>
           <p:cNvPr id="3" name="Рисунок 2"/>
@@ -11368,6 +11439,52 @@
                 <a:schemeClr val="accent6">
                   <a:lumMod val="75000"/>
                 </a:schemeClr>
+              </a:solidFill>
+            </a:endParaRPr>
+          </a:p>
+        </p:txBody>
+      </p:sp>
+      <p:sp>
+        <p:nvSpPr>
+          <p:cNvPr id="12" name="TextBox 11"/>
+          <p:cNvSpPr txBox="1"/>
+          <p:nvPr/>
+        </p:nvSpPr>
+        <p:spPr>
+          <a:xfrm>
+            <a:off x="8346757" y="6488668"/>
+            <a:ext cx="761747" cy="369332"/>
+          </a:xfrm>
+          <a:prstGeom prst="rect">
+            <a:avLst/>
+          </a:prstGeom>
+          <a:noFill/>
+        </p:spPr>
+        <p:txBody>
+          <a:bodyPr wrap="none" rtlCol="0">
+            <a:spAutoFit/>
+          </a:bodyPr>
+          <a:lstStyle/>
+          <a:p>
+            <a:r>
+              <a:rPr lang="en-US" smtClean="0">
+                <a:solidFill>
+                  <a:srgbClr val="002060"/>
+                </a:solidFill>
+              </a:rPr>
+              <a:t>18</a:t>
+            </a:r>
+            <a:r>
+              <a:rPr lang="en-US" smtClean="0">
+                <a:solidFill>
+                  <a:srgbClr val="002060"/>
+                </a:solidFill>
+              </a:rPr>
+              <a:t>/28</a:t>
+            </a:r>
+            <a:endParaRPr lang="en-US" smtClean="0">
+              <a:solidFill>
+                <a:srgbClr val="002060"/>
               </a:solidFill>
             </a:endParaRPr>
           </a:p>
@@ -11522,39 +11639,6 @@
           </a:p>
         </p:txBody>
       </p:sp>
-      <p:sp>
-        <p:nvSpPr>
-          <p:cNvPr id="9" name="TextBox 8"/>
-          <p:cNvSpPr txBox="1"/>
-          <p:nvPr/>
-        </p:nvSpPr>
-        <p:spPr>
-          <a:xfrm>
-            <a:off x="8479868" y="6488668"/>
-            <a:ext cx="633507" cy="369332"/>
-          </a:xfrm>
-          <a:prstGeom prst="rect">
-            <a:avLst/>
-          </a:prstGeom>
-          <a:noFill/>
-        </p:spPr>
-        <p:txBody>
-          <a:bodyPr wrap="none" rtlCol="0">
-            <a:spAutoFit/>
-          </a:bodyPr>
-          <a:lstStyle/>
-          <a:p>
-            <a:r>
-              <a:rPr lang="en-US" smtClean="0">
-                <a:solidFill>
-                  <a:srgbClr val="002060"/>
-                </a:solidFill>
-              </a:rPr>
-              <a:t>2/20</a:t>
-            </a:r>
-          </a:p>
-        </p:txBody>
-      </p:sp>
       <p:pic>
         <p:nvPicPr>
           <p:cNvPr id="3" name="Рисунок 2"/>
@@ -11856,6 +11940,52 @@
                 <a:schemeClr val="accent6">
                   <a:lumMod val="75000"/>
                 </a:schemeClr>
+              </a:solidFill>
+            </a:endParaRPr>
+          </a:p>
+        </p:txBody>
+      </p:sp>
+      <p:sp>
+        <p:nvSpPr>
+          <p:cNvPr id="12" name="TextBox 11"/>
+          <p:cNvSpPr txBox="1"/>
+          <p:nvPr/>
+        </p:nvSpPr>
+        <p:spPr>
+          <a:xfrm>
+            <a:off x="8346757" y="6488668"/>
+            <a:ext cx="761747" cy="369332"/>
+          </a:xfrm>
+          <a:prstGeom prst="rect">
+            <a:avLst/>
+          </a:prstGeom>
+          <a:noFill/>
+        </p:spPr>
+        <p:txBody>
+          <a:bodyPr wrap="none" rtlCol="0">
+            <a:spAutoFit/>
+          </a:bodyPr>
+          <a:lstStyle/>
+          <a:p>
+            <a:r>
+              <a:rPr lang="en-US" smtClean="0">
+                <a:solidFill>
+                  <a:srgbClr val="002060"/>
+                </a:solidFill>
+              </a:rPr>
+              <a:t>19</a:t>
+            </a:r>
+            <a:r>
+              <a:rPr lang="en-US" smtClean="0">
+                <a:solidFill>
+                  <a:srgbClr val="002060"/>
+                </a:solidFill>
+              </a:rPr>
+              <a:t>/28</a:t>
+            </a:r>
+            <a:endParaRPr lang="en-US" smtClean="0">
+              <a:solidFill>
+                <a:srgbClr val="002060"/>
               </a:solidFill>
             </a:endParaRPr>
           </a:p>
@@ -12038,8 +12168,13 @@
                   <a:srgbClr val="002060"/>
                 </a:solidFill>
               </a:rPr>
-              <a:t>2/20</a:t>
-            </a:r>
+              <a:t>2/28</a:t>
+            </a:r>
+            <a:endParaRPr lang="en-US" smtClean="0">
+              <a:solidFill>
+                <a:srgbClr val="002060"/>
+              </a:solidFill>
+            </a:endParaRPr>
           </a:p>
         </p:txBody>
       </p:sp>
@@ -12293,39 +12428,6 @@
           </a:p>
         </p:txBody>
       </p:sp>
-      <p:sp>
-        <p:nvSpPr>
-          <p:cNvPr id="9" name="TextBox 8"/>
-          <p:cNvSpPr txBox="1"/>
-          <p:nvPr/>
-        </p:nvSpPr>
-        <p:spPr>
-          <a:xfrm>
-            <a:off x="8479868" y="6488668"/>
-            <a:ext cx="633507" cy="369332"/>
-          </a:xfrm>
-          <a:prstGeom prst="rect">
-            <a:avLst/>
-          </a:prstGeom>
-          <a:noFill/>
-        </p:spPr>
-        <p:txBody>
-          <a:bodyPr wrap="none" rtlCol="0">
-            <a:spAutoFit/>
-          </a:bodyPr>
-          <a:lstStyle/>
-          <a:p>
-            <a:r>
-              <a:rPr lang="en-US" smtClean="0">
-                <a:solidFill>
-                  <a:srgbClr val="002060"/>
-                </a:solidFill>
-              </a:rPr>
-              <a:t>2/20</a:t>
-            </a:r>
-          </a:p>
-        </p:txBody>
-      </p:sp>
       <p:pic>
         <p:nvPicPr>
           <p:cNvPr id="3" name="Рисунок 2"/>
@@ -12648,6 +12750,60 @@
                 <a:schemeClr val="accent6">
                   <a:lumMod val="75000"/>
                 </a:schemeClr>
+              </a:solidFill>
+            </a:endParaRPr>
+          </a:p>
+        </p:txBody>
+      </p:sp>
+      <p:sp>
+        <p:nvSpPr>
+          <p:cNvPr id="11" name="TextBox 10"/>
+          <p:cNvSpPr txBox="1"/>
+          <p:nvPr/>
+        </p:nvSpPr>
+        <p:spPr>
+          <a:xfrm>
+            <a:off x="8346757" y="6488668"/>
+            <a:ext cx="761747" cy="369332"/>
+          </a:xfrm>
+          <a:prstGeom prst="rect">
+            <a:avLst/>
+          </a:prstGeom>
+          <a:noFill/>
+        </p:spPr>
+        <p:txBody>
+          <a:bodyPr wrap="none" rtlCol="0">
+            <a:spAutoFit/>
+          </a:bodyPr>
+          <a:lstStyle/>
+          <a:p>
+            <a:r>
+              <a:rPr lang="en-US">
+                <a:solidFill>
+                  <a:srgbClr val="002060"/>
+                </a:solidFill>
+              </a:rPr>
+              <a:t>2</a:t>
+            </a:r>
+            <a:r>
+              <a:rPr lang="en-US" smtClean="0">
+                <a:solidFill>
+                  <a:srgbClr val="002060"/>
+                </a:solidFill>
+              </a:rPr>
+              <a:t>0</a:t>
+            </a:r>
+            <a:r>
+              <a:rPr lang="en-US" smtClean="0">
+                <a:solidFill>
+                  <a:srgbClr val="002060"/>
+                </a:solidFill>
+              </a:rPr>
+              <a:t>/28</a:t>
+            </a:r>
+            <a:endParaRPr lang="en-US" smtClean="0">
+              <a:solidFill>
+                <a:srgbClr val="002060"/>
               </a:solidFill>
             </a:endParaRPr>
           </a:p>
@@ -12802,39 +12958,6 @@
           </a:p>
         </p:txBody>
       </p:sp>
-      <p:sp>
-        <p:nvSpPr>
-          <p:cNvPr id="9" name="TextBox 8"/>
-          <p:cNvSpPr txBox="1"/>
-          <p:nvPr/>
-        </p:nvSpPr>
-        <p:spPr>
-          <a:xfrm>
-            <a:off x="8479868" y="6488668"/>
-            <a:ext cx="633507" cy="369332"/>
-          </a:xfrm>
-          <a:prstGeom prst="rect">
-            <a:avLst/>
-          </a:prstGeom>
-          <a:noFill/>
-        </p:spPr>
-        <p:txBody>
-          <a:bodyPr wrap="none" rtlCol="0">
-            <a:spAutoFit/>
-          </a:bodyPr>
-          <a:lstStyle/>
-          <a:p>
-            <a:r>
-              <a:rPr lang="en-US" smtClean="0">
-                <a:solidFill>
-                  <a:srgbClr val="002060"/>
-                </a:solidFill>
-              </a:rPr>
-              <a:t>2/20</a:t>
-            </a:r>
-          </a:p>
-        </p:txBody>
-      </p:sp>
       <p:pic>
         <p:nvPicPr>
           <p:cNvPr id="3" name="Рисунок 2"/>
@@ -13144,6 +13267,44 @@
                 <a:schemeClr val="accent6">
                   <a:lumMod val="75000"/>
                 </a:schemeClr>
+              </a:solidFill>
+            </a:endParaRPr>
+          </a:p>
+        </p:txBody>
+      </p:sp>
+      <p:sp>
+        <p:nvSpPr>
+          <p:cNvPr id="11" name="TextBox 10"/>
+          <p:cNvSpPr txBox="1"/>
+          <p:nvPr/>
+        </p:nvSpPr>
+        <p:spPr>
+          <a:xfrm>
+            <a:off x="8346757" y="6488668"/>
+            <a:ext cx="761747" cy="369332"/>
+          </a:xfrm>
+          <a:prstGeom prst="rect">
+            <a:avLst/>
+          </a:prstGeom>
+          <a:noFill/>
+        </p:spPr>
+        <p:txBody>
+          <a:bodyPr wrap="none" rtlCol="0">
+            <a:spAutoFit/>
+          </a:bodyPr>
+          <a:lstStyle/>
+          <a:p>
+            <a:r>
+              <a:rPr lang="en-US" smtClean="0">
+                <a:solidFill>
+                  <a:srgbClr val="002060"/>
+                </a:solidFill>
+              </a:rPr>
+              <a:t>21/28</a:t>
+            </a:r>
+            <a:endParaRPr lang="en-US" smtClean="0">
+              <a:solidFill>
+                <a:srgbClr val="002060"/>
               </a:solidFill>
             </a:endParaRPr>
           </a:p>
@@ -13298,39 +13459,6 @@
           </a:p>
         </p:txBody>
       </p:sp>
-      <p:sp>
-        <p:nvSpPr>
-          <p:cNvPr id="9" name="TextBox 8"/>
-          <p:cNvSpPr txBox="1"/>
-          <p:nvPr/>
-        </p:nvSpPr>
-        <p:spPr>
-          <a:xfrm>
-            <a:off x="8479868" y="6488668"/>
-            <a:ext cx="633507" cy="369332"/>
-          </a:xfrm>
-          <a:prstGeom prst="rect">
-            <a:avLst/>
-          </a:prstGeom>
-          <a:noFill/>
-        </p:spPr>
-        <p:txBody>
-          <a:bodyPr wrap="none" rtlCol="0">
-            <a:spAutoFit/>
-          </a:bodyPr>
-          <a:lstStyle/>
-          <a:p>
-            <a:r>
-              <a:rPr lang="en-US" smtClean="0">
-                <a:solidFill>
-                  <a:srgbClr val="002060"/>
-                </a:solidFill>
-              </a:rPr>
-              <a:t>2/20</a:t>
-            </a:r>
-          </a:p>
-        </p:txBody>
-      </p:sp>
       <p:pic>
         <p:nvPicPr>
           <p:cNvPr id="3" name="Рисунок 2"/>
@@ -13688,6 +13816,44 @@
                 <a:schemeClr val="accent6">
                   <a:lumMod val="75000"/>
                 </a:schemeClr>
+              </a:solidFill>
+            </a:endParaRPr>
+          </a:p>
+        </p:txBody>
+      </p:sp>
+      <p:sp>
+        <p:nvSpPr>
+          <p:cNvPr id="11" name="TextBox 10"/>
+          <p:cNvSpPr txBox="1"/>
+          <p:nvPr/>
+        </p:nvSpPr>
+        <p:spPr>
+          <a:xfrm>
+            <a:off x="8346757" y="6488668"/>
+            <a:ext cx="761747" cy="369332"/>
+          </a:xfrm>
+          <a:prstGeom prst="rect">
+            <a:avLst/>
+          </a:prstGeom>
+          <a:noFill/>
+        </p:spPr>
+        <p:txBody>
+          <a:bodyPr wrap="none" rtlCol="0">
+            <a:spAutoFit/>
+          </a:bodyPr>
+          <a:lstStyle/>
+          <a:p>
+            <a:r>
+              <a:rPr lang="en-US" smtClean="0">
+                <a:solidFill>
+                  <a:srgbClr val="002060"/>
+                </a:solidFill>
+              </a:rPr>
+              <a:t>22/28</a:t>
+            </a:r>
+            <a:endParaRPr lang="en-US" smtClean="0">
+              <a:solidFill>
+                <a:srgbClr val="002060"/>
               </a:solidFill>
             </a:endParaRPr>
           </a:p>
@@ -13842,39 +14008,6 @@
           </a:p>
         </p:txBody>
       </p:sp>
-      <p:sp>
-        <p:nvSpPr>
-          <p:cNvPr id="9" name="TextBox 8"/>
-          <p:cNvSpPr txBox="1"/>
-          <p:nvPr/>
-        </p:nvSpPr>
-        <p:spPr>
-          <a:xfrm>
-            <a:off x="8479868" y="6488668"/>
-            <a:ext cx="633507" cy="369332"/>
-          </a:xfrm>
-          <a:prstGeom prst="rect">
-            <a:avLst/>
-          </a:prstGeom>
-          <a:noFill/>
-        </p:spPr>
-        <p:txBody>
-          <a:bodyPr wrap="none" rtlCol="0">
-            <a:spAutoFit/>
-          </a:bodyPr>
-          <a:lstStyle/>
-          <a:p>
-            <a:r>
-              <a:rPr lang="en-US" smtClean="0">
-                <a:solidFill>
-                  <a:srgbClr val="002060"/>
-                </a:solidFill>
-              </a:rPr>
-              <a:t>2/20</a:t>
-            </a:r>
-          </a:p>
-        </p:txBody>
-      </p:sp>
       <p:pic>
         <p:nvPicPr>
           <p:cNvPr id="3" name="Рисунок 2"/>
@@ -14181,23 +14314,59 @@
                   </a:schemeClr>
                 </a:solidFill>
               </a:rPr>
-              <a:t>ource: GoF book, Facade, </a:t>
-            </a:r>
-            <a:r>
-              <a:rPr lang="en-US" smtClean="0">
-                <a:solidFill>
-                  <a:schemeClr val="accent6">
-                    <a:lumMod val="75000"/>
-                  </a:schemeClr>
-                </a:solidFill>
-              </a:rPr>
-              <a:t>Related patterns</a:t>
+              <a:t>ource: GoF book, Facade, Related patterns</a:t>
             </a:r>
             <a:endParaRPr lang="en-US" u="sng">
               <a:solidFill>
                 <a:schemeClr val="accent6">
                   <a:lumMod val="75000"/>
                 </a:schemeClr>
+              </a:solidFill>
+            </a:endParaRPr>
+          </a:p>
+        </p:txBody>
+      </p:sp>
+      <p:sp>
+        <p:nvSpPr>
+          <p:cNvPr id="12" name="TextBox 11"/>
+          <p:cNvSpPr txBox="1"/>
+          <p:nvPr/>
+        </p:nvSpPr>
+        <p:spPr>
+          <a:xfrm>
+            <a:off x="8346757" y="6488668"/>
+            <a:ext cx="761747" cy="369332"/>
+          </a:xfrm>
+          <a:prstGeom prst="rect">
+            <a:avLst/>
+          </a:prstGeom>
+          <a:noFill/>
+        </p:spPr>
+        <p:txBody>
+          <a:bodyPr wrap="none" rtlCol="0">
+            <a:spAutoFit/>
+          </a:bodyPr>
+          <a:lstStyle/>
+          <a:p>
+            <a:r>
+              <a:rPr lang="en-US" smtClean="0">
+                <a:solidFill>
+                  <a:srgbClr val="002060"/>
+                </a:solidFill>
+              </a:rPr>
+              <a:t>23</a:t>
+            </a:r>
+            <a:r>
+              <a:rPr lang="en-US" smtClean="0">
+                <a:solidFill>
+                  <a:srgbClr val="002060"/>
+                </a:solidFill>
+              </a:rPr>
+              <a:t>/28</a:t>
+            </a:r>
+            <a:endParaRPr lang="en-US" smtClean="0">
+              <a:solidFill>
+                <a:srgbClr val="002060"/>
               </a:solidFill>
             </a:endParaRPr>
           </a:p>
@@ -14352,39 +14521,6 @@
           </a:p>
         </p:txBody>
       </p:sp>
-      <p:sp>
-        <p:nvSpPr>
-          <p:cNvPr id="9" name="TextBox 8"/>
-          <p:cNvSpPr txBox="1"/>
-          <p:nvPr/>
-        </p:nvSpPr>
-        <p:spPr>
-          <a:xfrm>
-            <a:off x="8479868" y="6488668"/>
-            <a:ext cx="633507" cy="369332"/>
-          </a:xfrm>
-          <a:prstGeom prst="rect">
-            <a:avLst/>
-          </a:prstGeom>
-          <a:noFill/>
-        </p:spPr>
-        <p:txBody>
-          <a:bodyPr wrap="none" rtlCol="0">
-            <a:spAutoFit/>
-          </a:bodyPr>
-          <a:lstStyle/>
-          <a:p>
-            <a:r>
-              <a:rPr lang="en-US" smtClean="0">
-                <a:solidFill>
-                  <a:srgbClr val="002060"/>
-                </a:solidFill>
-              </a:rPr>
-              <a:t>2/20</a:t>
-            </a:r>
-          </a:p>
-        </p:txBody>
-      </p:sp>
       <p:pic>
         <p:nvPicPr>
           <p:cNvPr id="3" name="Рисунок 2"/>
@@ -14749,6 +14885,44 @@
                 <a:schemeClr val="accent6">
                   <a:lumMod val="75000"/>
                 </a:schemeClr>
+              </a:solidFill>
+            </a:endParaRPr>
+          </a:p>
+        </p:txBody>
+      </p:sp>
+      <p:sp>
+        <p:nvSpPr>
+          <p:cNvPr id="11" name="TextBox 10"/>
+          <p:cNvSpPr txBox="1"/>
+          <p:nvPr/>
+        </p:nvSpPr>
+        <p:spPr>
+          <a:xfrm>
+            <a:off x="8346757" y="6488668"/>
+            <a:ext cx="761747" cy="369332"/>
+          </a:xfrm>
+          <a:prstGeom prst="rect">
+            <a:avLst/>
+          </a:prstGeom>
+          <a:noFill/>
+        </p:spPr>
+        <p:txBody>
+          <a:bodyPr wrap="none" rtlCol="0">
+            <a:spAutoFit/>
+          </a:bodyPr>
+          <a:lstStyle/>
+          <a:p>
+            <a:r>
+              <a:rPr lang="en-US" smtClean="0">
+                <a:solidFill>
+                  <a:srgbClr val="002060"/>
+                </a:solidFill>
+              </a:rPr>
+              <a:t>24/28</a:t>
+            </a:r>
+            <a:endParaRPr lang="en-US" smtClean="0">
+              <a:solidFill>
+                <a:srgbClr val="002060"/>
               </a:solidFill>
             </a:endParaRPr>
           </a:p>
@@ -14903,39 +15077,6 @@
           </a:p>
         </p:txBody>
       </p:sp>
-      <p:sp>
-        <p:nvSpPr>
-          <p:cNvPr id="9" name="TextBox 8"/>
-          <p:cNvSpPr txBox="1"/>
-          <p:nvPr/>
-        </p:nvSpPr>
-        <p:spPr>
-          <a:xfrm>
-            <a:off x="8479868" y="6488668"/>
-            <a:ext cx="633507" cy="369332"/>
-          </a:xfrm>
-          <a:prstGeom prst="rect">
-            <a:avLst/>
-          </a:prstGeom>
-          <a:noFill/>
-        </p:spPr>
-        <p:txBody>
-          <a:bodyPr wrap="none" rtlCol="0">
-            <a:spAutoFit/>
-          </a:bodyPr>
-          <a:lstStyle/>
-          <a:p>
-            <a:r>
-              <a:rPr lang="en-US" smtClean="0">
-                <a:solidFill>
-                  <a:srgbClr val="002060"/>
-                </a:solidFill>
-              </a:rPr>
-              <a:t>2/20</a:t>
-            </a:r>
-          </a:p>
-        </p:txBody>
-      </p:sp>
       <p:pic>
         <p:nvPicPr>
           <p:cNvPr id="3" name="Рисунок 2"/>
@@ -15258,23 +15399,51 @@
                   </a:schemeClr>
                 </a:solidFill>
               </a:rPr>
-              <a:t>ource: GoF book, Facade, </a:t>
-            </a:r>
-            <a:r>
-              <a:rPr lang="en-US" smtClean="0">
-                <a:solidFill>
-                  <a:schemeClr val="accent6">
-                    <a:lumMod val="75000"/>
-                  </a:schemeClr>
-                </a:solidFill>
-              </a:rPr>
-              <a:t>Related patterns</a:t>
+              <a:t>ource: GoF book, Facade, Related patterns</a:t>
             </a:r>
             <a:endParaRPr lang="en-US" u="sng">
               <a:solidFill>
                 <a:schemeClr val="accent6">
                   <a:lumMod val="75000"/>
                 </a:schemeClr>
+              </a:solidFill>
+            </a:endParaRPr>
+          </a:p>
+        </p:txBody>
+      </p:sp>
+      <p:sp>
+        <p:nvSpPr>
+          <p:cNvPr id="13" name="TextBox 12"/>
+          <p:cNvSpPr txBox="1"/>
+          <p:nvPr/>
+        </p:nvSpPr>
+        <p:spPr>
+          <a:xfrm>
+            <a:off x="8346757" y="6488668"/>
+            <a:ext cx="761747" cy="369332"/>
+          </a:xfrm>
+          <a:prstGeom prst="rect">
+            <a:avLst/>
+          </a:prstGeom>
+          <a:noFill/>
+        </p:spPr>
+        <p:txBody>
+          <a:bodyPr wrap="none" rtlCol="0">
+            <a:spAutoFit/>
+          </a:bodyPr>
+          <a:lstStyle/>
+          <a:p>
+            <a:r>
+              <a:rPr lang="en-US" smtClean="0">
+                <a:solidFill>
+                  <a:srgbClr val="002060"/>
+                </a:solidFill>
+              </a:rPr>
+              <a:t>25/28</a:t>
+            </a:r>
+            <a:endParaRPr lang="en-US" smtClean="0">
+              <a:solidFill>
+                <a:srgbClr val="002060"/>
               </a:solidFill>
             </a:endParaRPr>
           </a:p>
@@ -15429,39 +15598,6 @@
           </a:p>
         </p:txBody>
       </p:sp>
-      <p:sp>
-        <p:nvSpPr>
-          <p:cNvPr id="9" name="TextBox 8"/>
-          <p:cNvSpPr txBox="1"/>
-          <p:nvPr/>
-        </p:nvSpPr>
-        <p:spPr>
-          <a:xfrm>
-            <a:off x="8479868" y="6488668"/>
-            <a:ext cx="633507" cy="369332"/>
-          </a:xfrm>
-          <a:prstGeom prst="rect">
-            <a:avLst/>
-          </a:prstGeom>
-          <a:noFill/>
-        </p:spPr>
-        <p:txBody>
-          <a:bodyPr wrap="none" rtlCol="0">
-            <a:spAutoFit/>
-          </a:bodyPr>
-          <a:lstStyle/>
-          <a:p>
-            <a:r>
-              <a:rPr lang="en-US" smtClean="0">
-                <a:solidFill>
-                  <a:srgbClr val="002060"/>
-                </a:solidFill>
-              </a:rPr>
-              <a:t>2/20</a:t>
-            </a:r>
-          </a:p>
-        </p:txBody>
-      </p:sp>
       <p:pic>
         <p:nvPicPr>
           <p:cNvPr id="3" name="Рисунок 2"/>
@@ -15876,23 +16012,51 @@
                   </a:schemeClr>
                 </a:solidFill>
               </a:rPr>
-              <a:t>ource: GoF book, Facade, </a:t>
-            </a:r>
-            <a:r>
-              <a:rPr lang="en-US" smtClean="0">
-                <a:solidFill>
-                  <a:schemeClr val="accent6">
-                    <a:lumMod val="75000"/>
-                  </a:schemeClr>
-                </a:solidFill>
-              </a:rPr>
-              <a:t>Related patterns</a:t>
+              <a:t>ource: GoF book, Facade, Related patterns</a:t>
             </a:r>
             <a:endParaRPr lang="en-US" u="sng">
               <a:solidFill>
                 <a:schemeClr val="accent6">
                   <a:lumMod val="75000"/>
                 </a:schemeClr>
+              </a:solidFill>
+            </a:endParaRPr>
+          </a:p>
+        </p:txBody>
+      </p:sp>
+      <p:sp>
+        <p:nvSpPr>
+          <p:cNvPr id="11" name="TextBox 10"/>
+          <p:cNvSpPr txBox="1"/>
+          <p:nvPr/>
+        </p:nvSpPr>
+        <p:spPr>
+          <a:xfrm>
+            <a:off x="8346757" y="6488668"/>
+            <a:ext cx="761747" cy="369332"/>
+          </a:xfrm>
+          <a:prstGeom prst="rect">
+            <a:avLst/>
+          </a:prstGeom>
+          <a:noFill/>
+        </p:spPr>
+        <p:txBody>
+          <a:bodyPr wrap="none" rtlCol="0">
+            <a:spAutoFit/>
+          </a:bodyPr>
+          <a:lstStyle/>
+          <a:p>
+            <a:r>
+              <a:rPr lang="en-US" smtClean="0">
+                <a:solidFill>
+                  <a:srgbClr val="002060"/>
+                </a:solidFill>
+              </a:rPr>
+              <a:t>26/28</a:t>
+            </a:r>
+            <a:endParaRPr lang="en-US" smtClean="0">
+              <a:solidFill>
+                <a:srgbClr val="002060"/>
               </a:solidFill>
             </a:endParaRPr>
           </a:p>
@@ -16051,39 +16215,6 @@
       </p:sp>
       <p:sp>
         <p:nvSpPr>
-          <p:cNvPr id="9" name="TextBox 8"/>
-          <p:cNvSpPr txBox="1"/>
-          <p:nvPr/>
-        </p:nvSpPr>
-        <p:spPr>
-          <a:xfrm>
-            <a:off x="8479868" y="6488668"/>
-            <a:ext cx="633507" cy="369332"/>
-          </a:xfrm>
-          <a:prstGeom prst="rect">
-            <a:avLst/>
-          </a:prstGeom>
-          <a:noFill/>
-        </p:spPr>
-        <p:txBody>
-          <a:bodyPr wrap="none" rtlCol="0">
-            <a:spAutoFit/>
-          </a:bodyPr>
-          <a:lstStyle/>
-          <a:p>
-            <a:r>
-              <a:rPr lang="en-US" smtClean="0">
-                <a:solidFill>
-                  <a:srgbClr val="002060"/>
-                </a:solidFill>
-              </a:rPr>
-              <a:t>2/20</a:t>
-            </a:r>
-          </a:p>
-        </p:txBody>
-      </p:sp>
-      <p:sp>
-        <p:nvSpPr>
           <p:cNvPr id="3" name="Объект 2"/>
           <p:cNvSpPr>
             <a:spLocks noGrp="1"/>
@@ -16134,15 +16265,7 @@
             </a:r>
             <a:r>
               <a:rPr lang="en-US" sz="3200" smtClean="0"/>
-              <a:t>Vlissides; </a:t>
-            </a:r>
-            <a:r>
-              <a:rPr lang="en-US" sz="3200" smtClean="0"/>
-              <a:t>Facade </a:t>
-            </a:r>
-            <a:r>
-              <a:rPr lang="en-US" sz="3200" smtClean="0"/>
-              <a:t>and Pattern map.</a:t>
+              <a:t>Vlissides; Facade and Pattern map.</a:t>
             </a:r>
             <a:endParaRPr lang="ru-RU" sz="3200"/>
           </a:p>
@@ -16178,6 +16301,44 @@
           </a:prstGeom>
         </p:spPr>
       </p:pic>
+      <p:sp>
+        <p:nvSpPr>
+          <p:cNvPr id="11" name="TextBox 10"/>
+          <p:cNvSpPr txBox="1"/>
+          <p:nvPr/>
+        </p:nvSpPr>
+        <p:spPr>
+          <a:xfrm>
+            <a:off x="8346757" y="6488668"/>
+            <a:ext cx="761747" cy="369332"/>
+          </a:xfrm>
+          <a:prstGeom prst="rect">
+            <a:avLst/>
+          </a:prstGeom>
+          <a:noFill/>
+        </p:spPr>
+        <p:txBody>
+          <a:bodyPr wrap="none" rtlCol="0">
+            <a:spAutoFit/>
+          </a:bodyPr>
+          <a:lstStyle/>
+          <a:p>
+            <a:r>
+              <a:rPr lang="en-US" smtClean="0">
+                <a:solidFill>
+                  <a:srgbClr val="002060"/>
+                </a:solidFill>
+              </a:rPr>
+              <a:t>27/28</a:t>
+            </a:r>
+            <a:endParaRPr lang="en-US" smtClean="0">
+              <a:solidFill>
+                <a:srgbClr val="002060"/>
+              </a:solidFill>
+            </a:endParaRPr>
+          </a:p>
+        </p:txBody>
+      </p:sp>
     </p:spTree>
     <p:extLst>
       <p:ext uri="{BB962C8B-B14F-4D97-AF65-F5344CB8AC3E}">
@@ -16301,39 +16462,6 @@
       </p:sp>
       <p:sp>
         <p:nvSpPr>
-          <p:cNvPr id="9" name="TextBox 8"/>
-          <p:cNvSpPr txBox="1"/>
-          <p:nvPr/>
-        </p:nvSpPr>
-        <p:spPr>
-          <a:xfrm>
-            <a:off x="8479868" y="6488668"/>
-            <a:ext cx="633507" cy="369332"/>
-          </a:xfrm>
-          <a:prstGeom prst="rect">
-            <a:avLst/>
-          </a:prstGeom>
-          <a:noFill/>
-        </p:spPr>
-        <p:txBody>
-          <a:bodyPr wrap="none" rtlCol="0">
-            <a:spAutoFit/>
-          </a:bodyPr>
-          <a:lstStyle/>
-          <a:p>
-            <a:r>
-              <a:rPr lang="en-US" smtClean="0">
-                <a:solidFill>
-                  <a:srgbClr val="002060"/>
-                </a:solidFill>
-              </a:rPr>
-              <a:t>2/20</a:t>
-            </a:r>
-          </a:p>
-        </p:txBody>
-      </p:sp>
-      <p:sp>
-        <p:nvSpPr>
           <p:cNvPr id="4" name="Заголовок 3"/>
           <p:cNvSpPr>
             <a:spLocks noGrp="1"/>
@@ -16399,6 +16527,44 @@
           </a:prstGeom>
         </p:spPr>
       </p:pic>
+      <p:sp>
+        <p:nvSpPr>
+          <p:cNvPr id="11" name="TextBox 10"/>
+          <p:cNvSpPr txBox="1"/>
+          <p:nvPr/>
+        </p:nvSpPr>
+        <p:spPr>
+          <a:xfrm>
+            <a:off x="8346757" y="6488668"/>
+            <a:ext cx="761747" cy="369332"/>
+          </a:xfrm>
+          <a:prstGeom prst="rect">
+            <a:avLst/>
+          </a:prstGeom>
+          <a:noFill/>
+        </p:spPr>
+        <p:txBody>
+          <a:bodyPr wrap="none" rtlCol="0">
+            <a:spAutoFit/>
+          </a:bodyPr>
+          <a:lstStyle/>
+          <a:p>
+            <a:r>
+              <a:rPr lang="en-US" smtClean="0">
+                <a:solidFill>
+                  <a:srgbClr val="002060"/>
+                </a:solidFill>
+              </a:rPr>
+              <a:t>28/28</a:t>
+            </a:r>
+            <a:endParaRPr lang="en-US" smtClean="0">
+              <a:solidFill>
+                <a:srgbClr val="002060"/>
+              </a:solidFill>
+            </a:endParaRPr>
+          </a:p>
+        </p:txBody>
+      </p:sp>
     </p:spTree>
     <p:extLst>
       <p:ext uri="{BB962C8B-B14F-4D97-AF65-F5344CB8AC3E}">
@@ -16576,8 +16742,21 @@
                   <a:srgbClr val="002060"/>
                 </a:solidFill>
               </a:rPr>
-              <a:t>2/20</a:t>
-            </a:r>
+              <a:t>3</a:t>
+            </a:r>
+            <a:r>
+              <a:rPr lang="en-US" smtClean="0">
+                <a:solidFill>
+                  <a:srgbClr val="002060"/>
+                </a:solidFill>
+              </a:rPr>
+              <a:t>/28</a:t>
+            </a:r>
+            <a:endParaRPr lang="en-US" smtClean="0">
+              <a:solidFill>
+                <a:srgbClr val="002060"/>
+              </a:solidFill>
+            </a:endParaRPr>
           </a:p>
         </p:txBody>
       </p:sp>
@@ -16900,8 +17079,21 @@
                   <a:srgbClr val="002060"/>
                 </a:solidFill>
               </a:rPr>
-              <a:t>2/20</a:t>
-            </a:r>
+              <a:t>4</a:t>
+            </a:r>
+            <a:r>
+              <a:rPr lang="en-US" smtClean="0">
+                <a:solidFill>
+                  <a:srgbClr val="002060"/>
+                </a:solidFill>
+              </a:rPr>
+              <a:t>/28</a:t>
+            </a:r>
+            <a:endParaRPr lang="en-US" smtClean="0">
+              <a:solidFill>
+                <a:srgbClr val="002060"/>
+              </a:solidFill>
+            </a:endParaRPr>
           </a:p>
         </p:txBody>
       </p:sp>
@@ -17195,13 +17387,26 @@
           <a:lstStyle/>
           <a:p>
             <a:r>
+              <a:rPr lang="en-US">
+                <a:solidFill>
+                  <a:srgbClr val="002060"/>
+                </a:solidFill>
+              </a:rPr>
+              <a:t>5</a:t>
+            </a:r>
+            <a:r>
               <a:rPr lang="en-US" smtClean="0">
                 <a:solidFill>
                   <a:srgbClr val="002060"/>
                 </a:solidFill>
               </a:rPr>
-              <a:t>2/20</a:t>
-            </a:r>
+              <a:t>/28</a:t>
+            </a:r>
+            <a:endParaRPr lang="en-US" smtClean="0">
+              <a:solidFill>
+                <a:srgbClr val="002060"/>
+              </a:solidFill>
+            </a:endParaRPr>
           </a:p>
         </p:txBody>
       </p:sp>
@@ -17584,8 +17789,21 @@
                   <a:srgbClr val="002060"/>
                 </a:solidFill>
               </a:rPr>
-              <a:t>2/20</a:t>
-            </a:r>
+              <a:t>6</a:t>
+            </a:r>
+            <a:r>
+              <a:rPr lang="en-US" smtClean="0">
+                <a:solidFill>
+                  <a:srgbClr val="002060"/>
+                </a:solidFill>
+              </a:rPr>
+              <a:t>/28</a:t>
+            </a:r>
+            <a:endParaRPr lang="en-US" smtClean="0">
+              <a:solidFill>
+                <a:srgbClr val="002060"/>
+              </a:solidFill>
+            </a:endParaRPr>
           </a:p>
         </p:txBody>
       </p:sp>
@@ -17878,8 +18096,21 @@
                   <a:srgbClr val="002060"/>
                 </a:solidFill>
               </a:rPr>
-              <a:t>2/20</a:t>
-            </a:r>
+              <a:t>7</a:t>
+            </a:r>
+            <a:r>
+              <a:rPr lang="en-US" smtClean="0">
+                <a:solidFill>
+                  <a:srgbClr val="002060"/>
+                </a:solidFill>
+              </a:rPr>
+              <a:t>/28</a:t>
+            </a:r>
+            <a:endParaRPr lang="en-US" smtClean="0">
+              <a:solidFill>
+                <a:srgbClr val="002060"/>
+              </a:solidFill>
+            </a:endParaRPr>
           </a:p>
         </p:txBody>
       </p:sp>
@@ -18152,8 +18383,21 @@
                   <a:srgbClr val="002060"/>
                 </a:solidFill>
               </a:rPr>
-              <a:t>2/20</a:t>
-            </a:r>
+              <a:t>8</a:t>
+            </a:r>
+            <a:r>
+              <a:rPr lang="en-US" smtClean="0">
+                <a:solidFill>
+                  <a:srgbClr val="002060"/>
+                </a:solidFill>
+              </a:rPr>
+              <a:t>/28</a:t>
+            </a:r>
+            <a:endParaRPr lang="en-US" smtClean="0">
+              <a:solidFill>
+                <a:srgbClr val="002060"/>
+              </a:solidFill>
+            </a:endParaRPr>
           </a:p>
         </p:txBody>
       </p:sp>
@@ -18593,13 +18837,26 @@
           <a:lstStyle/>
           <a:p>
             <a:r>
+              <a:rPr lang="en-US">
+                <a:solidFill>
+                  <a:srgbClr val="002060"/>
+                </a:solidFill>
+              </a:rPr>
+              <a:t>9</a:t>
+            </a:r>
+            <a:r>
               <a:rPr lang="en-US" smtClean="0">
                 <a:solidFill>
                   <a:srgbClr val="002060"/>
                 </a:solidFill>
               </a:rPr>
-              <a:t>2/20</a:t>
-            </a:r>
+              <a:t>/28</a:t>
+            </a:r>
+            <a:endParaRPr lang="en-US" smtClean="0">
+              <a:solidFill>
+                <a:srgbClr val="002060"/>
+              </a:solidFill>
+            </a:endParaRPr>
           </a:p>
         </p:txBody>
       </p:sp>

</xml_diff>